<commit_message>
added diagrams to adv_new and redesigned basic_new
</commit_message>
<xml_diff>
--- a/adv_new/Module 02 - Working with environment.pptx
+++ b/adv_new/Module 02 - Working with environment.pptx
@@ -500,7 +500,7 @@
           <a:p>
             <a:fld id="{81043921-7569-41A3-B947-8944ED878C50}" type="datetimeFigureOut">
               <a:rPr lang="he-IL" smtClean="0"/>
-              <a:t>י"ג/תמוז/תשפ"ג</a:t>
+              <a:t>י"ט/תמוז/תשפ"ג</a:t>
             </a:fld>
             <a:endParaRPr lang="he-IL"/>
           </a:p>
@@ -3104,7 +3104,7 @@
           <a:p>
             <a:fld id="{A9D9B7D1-305C-49A9-9D59-000E5D30F1FD}" type="datetimeFigureOut">
               <a:rPr lang="he-IL" smtClean="0"/>
-              <a:t>י"ג/תמוז/תשפ"ג</a:t>
+              <a:t>י"ט/תמוז/תשפ"ג</a:t>
             </a:fld>
             <a:endParaRPr lang="he-IL"/>
           </a:p>
@@ -3304,7 +3304,7 @@
           <a:p>
             <a:fld id="{A9D9B7D1-305C-49A9-9D59-000E5D30F1FD}" type="datetimeFigureOut">
               <a:rPr lang="he-IL" smtClean="0"/>
-              <a:t>י"ג/תמוז/תשפ"ג</a:t>
+              <a:t>י"ט/תמוז/תשפ"ג</a:t>
             </a:fld>
             <a:endParaRPr lang="he-IL"/>
           </a:p>
@@ -3514,7 +3514,7 @@
           <a:p>
             <a:fld id="{A9D9B7D1-305C-49A9-9D59-000E5D30F1FD}" type="datetimeFigureOut">
               <a:rPr lang="he-IL" smtClean="0"/>
-              <a:t>י"ג/תמוז/תשפ"ג</a:t>
+              <a:t>י"ט/תמוז/תשפ"ג</a:t>
             </a:fld>
             <a:endParaRPr lang="he-IL"/>
           </a:p>
@@ -5648,7 +5648,7 @@
           <a:p>
             <a:fld id="{A9D9B7D1-305C-49A9-9D59-000E5D30F1FD}" type="datetimeFigureOut">
               <a:rPr lang="he-IL" smtClean="0"/>
-              <a:t>י"ג/תמוז/תשפ"ג</a:t>
+              <a:t>י"ט/תמוז/תשפ"ג</a:t>
             </a:fld>
             <a:endParaRPr lang="he-IL"/>
           </a:p>
@@ -5924,7 +5924,7 @@
           <a:p>
             <a:fld id="{A9D9B7D1-305C-49A9-9D59-000E5D30F1FD}" type="datetimeFigureOut">
               <a:rPr lang="he-IL" smtClean="0"/>
-              <a:t>י"ג/תמוז/תשפ"ג</a:t>
+              <a:t>י"ט/תמוז/תשפ"ג</a:t>
             </a:fld>
             <a:endParaRPr lang="he-IL"/>
           </a:p>
@@ -6192,7 +6192,7 @@
           <a:p>
             <a:fld id="{A9D9B7D1-305C-49A9-9D59-000E5D30F1FD}" type="datetimeFigureOut">
               <a:rPr lang="he-IL" smtClean="0"/>
-              <a:t>י"ג/תמוז/תשפ"ג</a:t>
+              <a:t>י"ט/תמוז/תשפ"ג</a:t>
             </a:fld>
             <a:endParaRPr lang="he-IL"/>
           </a:p>
@@ -6607,7 +6607,7 @@
           <a:p>
             <a:fld id="{A9D9B7D1-305C-49A9-9D59-000E5D30F1FD}" type="datetimeFigureOut">
               <a:rPr lang="he-IL" smtClean="0"/>
-              <a:t>י"ג/תמוז/תשפ"ג</a:t>
+              <a:t>י"ט/תמוז/תשפ"ג</a:t>
             </a:fld>
             <a:endParaRPr lang="he-IL"/>
           </a:p>
@@ -6749,7 +6749,7 @@
           <a:p>
             <a:fld id="{A9D9B7D1-305C-49A9-9D59-000E5D30F1FD}" type="datetimeFigureOut">
               <a:rPr lang="he-IL" smtClean="0"/>
-              <a:t>י"ג/תמוז/תשפ"ג</a:t>
+              <a:t>י"ט/תמוז/תשפ"ג</a:t>
             </a:fld>
             <a:endParaRPr lang="he-IL"/>
           </a:p>
@@ -6862,7 +6862,7 @@
           <a:p>
             <a:fld id="{A9D9B7D1-305C-49A9-9D59-000E5D30F1FD}" type="datetimeFigureOut">
               <a:rPr lang="he-IL" smtClean="0"/>
-              <a:t>י"ג/תמוז/תשפ"ג</a:t>
+              <a:t>י"ט/תמוז/תשפ"ג</a:t>
             </a:fld>
             <a:endParaRPr lang="he-IL"/>
           </a:p>
@@ -7175,7 +7175,7 @@
           <a:p>
             <a:fld id="{A9D9B7D1-305C-49A9-9D59-000E5D30F1FD}" type="datetimeFigureOut">
               <a:rPr lang="he-IL" smtClean="0"/>
-              <a:t>י"ג/תמוז/תשפ"ג</a:t>
+              <a:t>י"ט/תמוז/תשפ"ג</a:t>
             </a:fld>
             <a:endParaRPr lang="he-IL"/>
           </a:p>
@@ -7464,7 +7464,7 @@
           <a:p>
             <a:fld id="{A9D9B7D1-305C-49A9-9D59-000E5D30F1FD}" type="datetimeFigureOut">
               <a:rPr lang="he-IL" smtClean="0"/>
-              <a:t>י"ג/תמוז/תשפ"ג</a:t>
+              <a:t>י"ט/תמוז/תשפ"ג</a:t>
             </a:fld>
             <a:endParaRPr lang="he-IL"/>
           </a:p>
@@ -7707,7 +7707,7 @@
           <a:p>
             <a:fld id="{A9D9B7D1-305C-49A9-9D59-000E5D30F1FD}" type="datetimeFigureOut">
               <a:rPr lang="he-IL" smtClean="0"/>
-              <a:t>י"ג/תמוז/תשפ"ג</a:t>
+              <a:t>י"ט/תמוז/תשפ"ג</a:t>
             </a:fld>
             <a:endParaRPr lang="he-IL"/>
           </a:p>
@@ -11417,13 +11417,13 @@
         </p:nvSpPr>
         <p:spPr>
           <a:xfrm>
-            <a:off x="838200" y="1690688"/>
-            <a:ext cx="10515600" cy="4486275"/>
+            <a:off x="517469" y="4685761"/>
+            <a:ext cx="10515600" cy="1807114"/>
           </a:xfrm>
         </p:spPr>
         <p:txBody>
           <a:bodyPr>
-            <a:normAutofit/>
+            <a:normAutofit fontScale="92500" lnSpcReduction="20000"/>
           </a:bodyPr>
           <a:lstStyle/>
           <a:p>
@@ -11502,6 +11502,36 @@
           </a:p>
         </p:txBody>
       </p:sp>
+      <p:pic>
+        <p:nvPicPr>
+          <p:cNvPr id="6" name="Picture 5">
+            <a:extLst>
+              <a:ext uri="{FF2B5EF4-FFF2-40B4-BE49-F238E27FC236}">
+                <a16:creationId xmlns:a16="http://schemas.microsoft.com/office/drawing/2014/main" id="{2AD8C816-0A05-4A26-8AC4-9C5C2DF0E199}"/>
+              </a:ext>
+            </a:extLst>
+          </p:cNvPr>
+          <p:cNvPicPr>
+            <a:picLocks noChangeAspect="1"/>
+          </p:cNvPicPr>
+          <p:nvPr/>
+        </p:nvPicPr>
+        <p:blipFill>
+          <a:blip r:embed="rId3"/>
+          <a:stretch>
+            <a:fillRect/>
+          </a:stretch>
+        </p:blipFill>
+        <p:spPr>
+          <a:xfrm>
+            <a:off x="3116753" y="1349407"/>
+            <a:ext cx="5317031" cy="3041370"/>
+          </a:xfrm>
+          <a:prstGeom prst="rect">
+            <a:avLst/>
+          </a:prstGeom>
+        </p:spPr>
+      </p:pic>
     </p:spTree>
     <p:extLst>
       <p:ext uri="{BB962C8B-B14F-4D97-AF65-F5344CB8AC3E}">

</xml_diff>

<commit_message>
Complete adv_new design and issues fix
</commit_message>
<xml_diff>
--- a/adv_new/Module 02 - Working with environment.pptx
+++ b/adv_new/Module 02 - Working with environment.pptx
@@ -8,7 +8,7 @@
     <p:notesMasterId r:id="rId22"/>
   </p:notesMasterIdLst>
   <p:sldIdLst>
-    <p:sldId id="321" r:id="rId2"/>
+    <p:sldId id="336" r:id="rId2"/>
     <p:sldId id="258" r:id="rId3"/>
     <p:sldId id="264" r:id="rId4"/>
     <p:sldId id="331" r:id="rId5"/>
@@ -500,7 +500,7 @@
           <a:p>
             <a:fld id="{81043921-7569-41A3-B947-8944ED878C50}" type="datetimeFigureOut">
               <a:rPr lang="he-IL" smtClean="0"/>
-              <a:t>י"ט/תמוז/תשפ"ג</a:t>
+              <a:t>כ'/תמוז/תשפ"ג</a:t>
             </a:fld>
             <a:endParaRPr lang="he-IL"/>
           </a:p>
@@ -769,11 +769,11 @@
 </file>
 
 <file path=ppt/notesSlides/notesSlide1.xml><?xml version="1.0" encoding="utf-8"?>
-<p:notes xmlns:a="http://schemas.openxmlformats.org/drawingml/2006/main" xmlns:r="http://schemas.openxmlformats.org/officeDocument/2006/relationships" xmlns:p="http://schemas.openxmlformats.org/presentationml/2006/main">
+<p:notes xmlns:a="http://schemas.openxmlformats.org/drawingml/2006/main" xmlns:r="http://schemas.openxmlformats.org/officeDocument/2006/relationships" xmlns:p="http://schemas.openxmlformats.org/presentationml/2006/main" showMasterSp="0" showMasterPhAnim="0">
   <p:cSld>
     <p:spTree>
       <p:nvGrpSpPr>
-        <p:cNvPr id="1" name=""/>
+        <p:cNvPr id="1" name="Shape 158"/>
         <p:cNvGrpSpPr/>
         <p:nvPr/>
       </p:nvGrpSpPr>
@@ -787,207 +787,84 @@
       </p:grpSpPr>
       <p:sp>
         <p:nvSpPr>
-          <p:cNvPr id="2" name="Slide Image Placeholder 1"/>
-          <p:cNvSpPr>
-            <a:spLocks noGrp="1" noRot="1" noChangeAspect="1"/>
-          </p:cNvSpPr>
-          <p:nvPr>
-            <p:ph type="sldImg"/>
-          </p:nvPr>
-        </p:nvSpPr>
-        <p:spPr/>
-      </p:sp>
-      <p:sp>
-        <p:nvSpPr>
-          <p:cNvPr id="3" name="Notes Placeholder 2"/>
-          <p:cNvSpPr>
+          <p:cNvPr id="159" name="Google Shape;159;p3:notes"/>
+          <p:cNvSpPr txBox="1">
             <a:spLocks noGrp="1"/>
           </p:cNvSpPr>
           <p:nvPr>
             <p:ph type="body" idx="1"/>
           </p:nvPr>
         </p:nvSpPr>
-        <p:spPr/>
+        <p:spPr>
+          <a:xfrm>
+            <a:off x="685800" y="4400550"/>
+            <a:ext cx="5486400" cy="3600450"/>
+          </a:xfrm>
+          <a:prstGeom prst="rect">
+            <a:avLst/>
+          </a:prstGeom>
+        </p:spPr>
         <p:txBody>
-          <a:bodyPr/>
+          <a:bodyPr spcFirstLastPara="1" wrap="square" lIns="91425" tIns="45700" rIns="91425" bIns="45700" anchor="t" anchorCtr="0">
+            <a:noAutofit/>
+          </a:bodyPr>
           <a:lstStyle/>
           <a:p>
-            <a:r>
-              <a:rPr lang="en-US" dirty="0"/>
-              <a:t>Python is dynamically-typed and garbage-collected. It supports multiple programming paradigms, including structured (particularly, procedural), object-oriented and functional programming.</a:t>
-            </a:r>
-          </a:p>
-          <a:p>
-            <a:endParaRPr lang="en-US" sz="1200" dirty="0">
-              <a:cs typeface="Calibri"/>
-            </a:endParaRPr>
-          </a:p>
-          <a:p>
-            <a:r>
-              <a:rPr lang="en-US" dirty="0">
-                <a:cs typeface="Calibri"/>
-              </a:rPr>
-              <a:t>It was built to be as readable as possible, and is </a:t>
-            </a:r>
-            <a:r>
-              <a:rPr lang="en-US" dirty="0"/>
-              <a:t>significant indentation driven (Off-side rule).</a:t>
-            </a:r>
-            <a:endParaRPr lang="en-US" dirty="0">
-              <a:cs typeface="Calibri"/>
-            </a:endParaRPr>
-          </a:p>
-          <a:p>
-            <a:pPr algn="l" rtl="0" eaLnBrk="1" hangingPunct="1"/>
-            <a:endParaRPr lang="en-US"/>
-          </a:p>
-          <a:p>
-            <a:r>
-              <a:rPr lang="en-US" dirty="0"/>
-              <a:t>The language's core philosophy is summarized in the document </a:t>
-            </a:r>
-            <a:r>
-              <a:rPr lang="en-US" i="1" dirty="0"/>
-              <a:t>The Zen of Python</a:t>
-            </a:r>
-            <a:r>
-              <a:rPr lang="en-US" dirty="0"/>
-              <a:t> (</a:t>
-            </a:r>
-            <a:r>
-              <a:rPr lang="en-US" i="1" dirty="0"/>
-              <a:t>PEP 20</a:t>
-            </a:r>
-            <a:r>
-              <a:rPr lang="en-US" dirty="0"/>
-              <a:t>), which includes aphorisms such as:</a:t>
-            </a:r>
-            <a:endParaRPr lang="en-US" dirty="0">
-              <a:cs typeface="Calibri"/>
-            </a:endParaRPr>
-          </a:p>
-          <a:p>
-            <a:pPr marL="285750" indent="-285750">
-              <a:buFont typeface="Arial"/>
-              <a:buChar char="•"/>
+            <a:pPr marL="0" lvl="0" indent="0" algn="l" rtl="0">
+              <a:spcBef>
+                <a:spcPts val="0"/>
+              </a:spcBef>
+              <a:spcAft>
+                <a:spcPts val="0"/>
+              </a:spcAft>
+              <a:buNone/>
             </a:pPr>
-            <a:r>
-              <a:rPr lang="en-US" dirty="0"/>
-              <a:t>Beautiful is better than ugly.</a:t>
-            </a:r>
-            <a:endParaRPr lang="en-US" dirty="0">
-              <a:cs typeface="Calibri"/>
-            </a:endParaRPr>
-          </a:p>
-          <a:p>
-            <a:pPr marL="285750" indent="-285750">
-              <a:buFont typeface="Arial"/>
-              <a:buChar char="•"/>
-            </a:pPr>
-            <a:r>
-              <a:rPr lang="en-US" dirty="0"/>
-              <a:t>Explicit is better than implicit.</a:t>
-            </a:r>
-            <a:endParaRPr lang="en-US" dirty="0">
-              <a:cs typeface="Calibri"/>
-            </a:endParaRPr>
-          </a:p>
-          <a:p>
-            <a:pPr marL="285750" indent="-285750">
-              <a:buFont typeface="Arial"/>
-              <a:buChar char="•"/>
-            </a:pPr>
-            <a:r>
-              <a:rPr lang="en-US" dirty="0"/>
-              <a:t>Simple is better than complex.</a:t>
-            </a:r>
-            <a:endParaRPr lang="en-US" dirty="0">
-              <a:cs typeface="Calibri"/>
-            </a:endParaRPr>
-          </a:p>
-          <a:p>
-            <a:pPr marL="285750" indent="-285750">
-              <a:buFont typeface="Arial"/>
-              <a:buChar char="•"/>
-            </a:pPr>
-            <a:r>
-              <a:rPr lang="en-US" dirty="0"/>
-              <a:t>Complex is better than complicated.</a:t>
-            </a:r>
-            <a:endParaRPr lang="en-US" dirty="0">
-              <a:cs typeface="Calibri"/>
-            </a:endParaRPr>
-          </a:p>
-          <a:p>
-            <a:pPr marL="285750" indent="-285750">
-              <a:buFont typeface="Arial"/>
-              <a:buChar char="•"/>
-            </a:pPr>
-            <a:r>
-              <a:rPr lang="en-US" dirty="0"/>
-              <a:t>Readability counts.</a:t>
-            </a:r>
-            <a:endParaRPr lang="en-US" dirty="0">
-              <a:cs typeface="Calibri"/>
-            </a:endParaRPr>
-          </a:p>
-          <a:p>
-            <a:pPr algn="l"/>
-            <a:endParaRPr lang="en-US" dirty="0">
-              <a:cs typeface="Calibri"/>
-            </a:endParaRPr>
-          </a:p>
-          <a:p>
-            <a:endParaRPr lang="en-US" u="sng"/>
-          </a:p>
-          <a:p>
-            <a:pPr algn="l" rtl="0" eaLnBrk="1" hangingPunct="1"/>
-            <a:r>
-              <a:rPr lang="en-US" u="sng" dirty="0"/>
-              <a:t>For further reading:</a:t>
-            </a:r>
-          </a:p>
-          <a:p>
-            <a:r>
-              <a:rPr lang="en-US" dirty="0">
-                <a:hlinkClick r:id="rId3"/>
-              </a:rPr>
-              <a:t>Python (programming language) - Wikipedia</a:t>
-            </a:r>
-            <a:endParaRPr lang="en-US"/>
+            <a:endParaRPr/>
           </a:p>
         </p:txBody>
       </p:sp>
       <p:sp>
         <p:nvSpPr>
-          <p:cNvPr id="4" name="Slide Number Placeholder 3"/>
+          <p:cNvPr id="160" name="Google Shape;160;p3:notes"/>
           <p:cNvSpPr>
-            <a:spLocks noGrp="1"/>
+            <a:spLocks noGrp="1" noRot="1" noChangeAspect="1"/>
           </p:cNvSpPr>
           <p:nvPr>
-            <p:ph type="sldNum" sz="quarter" idx="10"/>
+            <p:ph type="sldImg" idx="2"/>
           </p:nvPr>
         </p:nvSpPr>
-        <p:spPr/>
-        <p:txBody>
-          <a:bodyPr/>
-          <a:lstStyle/>
-          <a:p>
-            <a:fld id="{C18343ED-3762-4D46-A439-B4D407E13EF8}" type="slidenum">
-              <a:rPr lang="en-US" smtClean="0"/>
-              <a:pPr/>
-              <a:t>3</a:t>
-            </a:fld>
-            <a:endParaRPr lang="en-US"/>
-          </a:p>
-        </p:txBody>
+        <p:spPr>
+          <a:xfrm>
+            <a:off x="685800" y="1143000"/>
+            <a:ext cx="5486400" cy="3086100"/>
+          </a:xfrm>
+          <a:custGeom>
+            <a:avLst/>
+            <a:gdLst/>
+            <a:ahLst/>
+            <a:cxnLst/>
+            <a:rect l="l" t="t" r="r" b="b"/>
+            <a:pathLst>
+              <a:path w="120000" h="120000" extrusionOk="0">
+                <a:moveTo>
+                  <a:pt x="0" y="0"/>
+                </a:moveTo>
+                <a:lnTo>
+                  <a:pt x="120000" y="0"/>
+                </a:lnTo>
+                <a:lnTo>
+                  <a:pt x="120000" y="120000"/>
+                </a:lnTo>
+                <a:lnTo>
+                  <a:pt x="0" y="120000"/>
+                </a:lnTo>
+                <a:close/>
+              </a:path>
+            </a:pathLst>
+          </a:custGeom>
+        </p:spPr>
       </p:sp>
     </p:spTree>
-    <p:extLst>
-      <p:ext uri="{BB962C8B-B14F-4D97-AF65-F5344CB8AC3E}">
-        <p14:creationId xmlns:p14="http://schemas.microsoft.com/office/powerpoint/2010/main" val="3003253182"/>
-      </p:ext>
-    </p:extLst>
   </p:cSld>
   <p:clrMapOvr>
     <a:masterClrMapping/>
@@ -1178,6 +1055,208 @@
             <a:fld id="{C18343ED-3762-4D46-A439-B4D407E13EF8}" type="slidenum">
               <a:rPr lang="en-US" smtClean="0"/>
               <a:pPr/>
+              <a:t>16</a:t>
+            </a:fld>
+            <a:endParaRPr lang="en-US"/>
+          </a:p>
+        </p:txBody>
+      </p:sp>
+    </p:spTree>
+    <p:extLst>
+      <p:ext uri="{BB962C8B-B14F-4D97-AF65-F5344CB8AC3E}">
+        <p14:creationId xmlns:p14="http://schemas.microsoft.com/office/powerpoint/2010/main" val="89710469"/>
+      </p:ext>
+    </p:extLst>
+  </p:cSld>
+  <p:clrMapOvr>
+    <a:masterClrMapping/>
+  </p:clrMapOvr>
+</p:notes>
+</file>
+
+<file path=ppt/notesSlides/notesSlide11.xml><?xml version="1.0" encoding="utf-8"?>
+<p:notes xmlns:a="http://schemas.openxmlformats.org/drawingml/2006/main" xmlns:r="http://schemas.openxmlformats.org/officeDocument/2006/relationships" xmlns:p="http://schemas.openxmlformats.org/presentationml/2006/main">
+  <p:cSld>
+    <p:spTree>
+      <p:nvGrpSpPr>
+        <p:cNvPr id="1" name=""/>
+        <p:cNvGrpSpPr/>
+        <p:nvPr/>
+      </p:nvGrpSpPr>
+      <p:grpSpPr>
+        <a:xfrm>
+          <a:off x="0" y="0"/>
+          <a:ext cx="0" cy="0"/>
+          <a:chOff x="0" y="0"/>
+          <a:chExt cx="0" cy="0"/>
+        </a:xfrm>
+      </p:grpSpPr>
+      <p:sp>
+        <p:nvSpPr>
+          <p:cNvPr id="2" name="Slide Image Placeholder 1"/>
+          <p:cNvSpPr>
+            <a:spLocks noGrp="1" noRot="1" noChangeAspect="1"/>
+          </p:cNvSpPr>
+          <p:nvPr>
+            <p:ph type="sldImg"/>
+          </p:nvPr>
+        </p:nvSpPr>
+        <p:spPr/>
+      </p:sp>
+      <p:sp>
+        <p:nvSpPr>
+          <p:cNvPr id="3" name="Notes Placeholder 2"/>
+          <p:cNvSpPr>
+            <a:spLocks noGrp="1"/>
+          </p:cNvSpPr>
+          <p:nvPr>
+            <p:ph type="body" idx="1"/>
+          </p:nvPr>
+        </p:nvSpPr>
+        <p:spPr/>
+        <p:txBody>
+          <a:bodyPr/>
+          <a:lstStyle/>
+          <a:p>
+            <a:r>
+              <a:rPr lang="en-US" dirty="0">
+                <a:solidFill>
+                  <a:srgbClr val="000000"/>
+                </a:solidFill>
+                <a:latin typeface="Tahoma"/>
+                <a:ea typeface="Tahoma"/>
+                <a:cs typeface="Tahoma"/>
+              </a:rPr>
+              <a:t>PyCharm is currently one of the most used IDE for python development, It provides code analysis, a graphical debugger, an integrated unit tester, integration with version control systems (VCSes), and supports web development with Django as well as data science with Anaconda.</a:t>
+            </a:r>
+          </a:p>
+          <a:p>
+            <a:endParaRPr lang="en-US" dirty="0">
+              <a:solidFill>
+                <a:srgbClr val="000000"/>
+              </a:solidFill>
+              <a:latin typeface="Tahoma"/>
+              <a:ea typeface="Tahoma"/>
+              <a:cs typeface="Tahoma"/>
+            </a:endParaRPr>
+          </a:p>
+          <a:p>
+            <a:r>
+              <a:rPr lang="en-US" dirty="0">
+                <a:solidFill>
+                  <a:srgbClr val="000000"/>
+                </a:solidFill>
+                <a:latin typeface="Tahoma"/>
+                <a:ea typeface="Tahoma"/>
+                <a:cs typeface="Tahoma"/>
+              </a:rPr>
+              <a:t>It was created by JetBrains</a:t>
+            </a:r>
+          </a:p>
+          <a:p>
+            <a:endParaRPr lang="en-US" dirty="0">
+              <a:solidFill>
+                <a:srgbClr val="000000"/>
+              </a:solidFill>
+              <a:latin typeface="Tahoma"/>
+              <a:ea typeface="Tahoma"/>
+              <a:cs typeface="Tahoma"/>
+            </a:endParaRPr>
+          </a:p>
+          <a:p>
+            <a:r>
+              <a:rPr lang="en-US" dirty="0">
+                <a:solidFill>
+                  <a:srgbClr val="000000"/>
+                </a:solidFill>
+                <a:latin typeface="Tahoma"/>
+                <a:ea typeface="Tahoma"/>
+                <a:cs typeface="Tahoma"/>
+              </a:rPr>
+              <a:t>It is mostly popular because of many things, such as:</a:t>
+            </a:r>
+          </a:p>
+          <a:p>
+            <a:pPr marL="171450" indent="-171450">
+              <a:buFont typeface="Arial"/>
+              <a:buChar char="•"/>
+            </a:pPr>
+            <a:r>
+              <a:rPr lang="en-US" dirty="0">
+                <a:solidFill>
+                  <a:srgbClr val="000000"/>
+                </a:solidFill>
+                <a:latin typeface="Tahoma"/>
+                <a:ea typeface="Tahoma"/>
+                <a:cs typeface="Tahoma"/>
+              </a:rPr>
+              <a:t>It is considered as an intelligent code editor, fast and safe refactoring, and smart code.</a:t>
+            </a:r>
+          </a:p>
+          <a:p>
+            <a:pPr marL="171450" indent="-171450">
+              <a:buFont typeface="Arial"/>
+              <a:buChar char="•"/>
+            </a:pPr>
+            <a:r>
+              <a:rPr lang="en-US" dirty="0">
+                <a:solidFill>
+                  <a:srgbClr val="000000"/>
+                </a:solidFill>
+                <a:latin typeface="Tahoma"/>
+                <a:ea typeface="Tahoma"/>
+                <a:cs typeface="Tahoma"/>
+              </a:rPr>
+              <a:t>Features for debugging, profiling, remote development, testing the code, auto code completion, quick fixing, error detection and tools of the database.</a:t>
+            </a:r>
+          </a:p>
+          <a:p>
+            <a:pPr marL="171450" indent="-171450">
+              <a:buFont typeface="Arial"/>
+              <a:buChar char="•"/>
+            </a:pPr>
+            <a:r>
+              <a:rPr lang="en-US" dirty="0">
+                <a:solidFill>
+                  <a:srgbClr val="000000"/>
+                </a:solidFill>
+                <a:latin typeface="Tahoma"/>
+                <a:ea typeface="Tahoma"/>
+                <a:cs typeface="Tahoma"/>
+              </a:rPr>
+              <a:t>Support for Popular web technologies, web frameworks, scientific libraries and version control. </a:t>
+            </a:r>
+          </a:p>
+          <a:p>
+            <a:endParaRPr lang="en-US" dirty="0">
+              <a:solidFill>
+                <a:srgbClr val="000000"/>
+              </a:solidFill>
+              <a:latin typeface="Tahoma"/>
+              <a:ea typeface="Tahoma"/>
+              <a:cs typeface="Tahoma"/>
+            </a:endParaRPr>
+          </a:p>
+        </p:txBody>
+      </p:sp>
+      <p:sp>
+        <p:nvSpPr>
+          <p:cNvPr id="4" name="Slide Number Placeholder 3"/>
+          <p:cNvSpPr>
+            <a:spLocks noGrp="1"/>
+          </p:cNvSpPr>
+          <p:nvPr>
+            <p:ph type="sldNum" sz="quarter" idx="10"/>
+          </p:nvPr>
+        </p:nvSpPr>
+        <p:spPr/>
+        <p:txBody>
+          <a:bodyPr/>
+          <a:lstStyle/>
+          <a:p>
+            <a:fld id="{C18343ED-3762-4D46-A439-B4D407E13EF8}" type="slidenum">
+              <a:rPr lang="en-US" smtClean="0"/>
+              <a:pPr/>
               <a:t>17</a:t>
             </a:fld>
             <a:endParaRPr lang="en-US"/>
@@ -1197,7 +1276,7 @@
 </p:notes>
 </file>
 
-<file path=ppt/notesSlides/notesSlide11.xml><?xml version="1.0" encoding="utf-8"?>
+<file path=ppt/notesSlides/notesSlide12.xml><?xml version="1.0" encoding="utf-8"?>
 <p:notes xmlns:a="http://schemas.openxmlformats.org/drawingml/2006/main" xmlns:r="http://schemas.openxmlformats.org/officeDocument/2006/relationships" xmlns:p="http://schemas.openxmlformats.org/presentationml/2006/main">
   <p:cSld>
     <p:spTree>
@@ -1497,7 +1576,7 @@
             <a:fld id="{C18343ED-3762-4D46-A439-B4D407E13EF8}" type="slidenum">
               <a:rPr lang="en-US" smtClean="0"/>
               <a:pPr/>
-              <a:t>4</a:t>
+              <a:t>3</a:t>
             </a:fld>
             <a:endParaRPr lang="en-US"/>
           </a:p>
@@ -1506,7 +1585,7 @@
     </p:spTree>
     <p:extLst>
       <p:ext uri="{BB962C8B-B14F-4D97-AF65-F5344CB8AC3E}">
-        <p14:creationId xmlns:p14="http://schemas.microsoft.com/office/powerpoint/2010/main" val="1518102087"/>
+        <p14:creationId xmlns:p14="http://schemas.microsoft.com/office/powerpoint/2010/main" val="3003253182"/>
       </p:ext>
     </p:extLst>
   </p:cSld>
@@ -1724,7 +1803,7 @@
             <a:fld id="{C18343ED-3762-4D46-A439-B4D407E13EF8}" type="slidenum">
               <a:rPr lang="en-US" smtClean="0"/>
               <a:pPr/>
-              <a:t>5</a:t>
+              <a:t>4</a:t>
             </a:fld>
             <a:endParaRPr lang="en-US"/>
           </a:p>
@@ -1733,7 +1812,7 @@
     </p:spTree>
     <p:extLst>
       <p:ext uri="{BB962C8B-B14F-4D97-AF65-F5344CB8AC3E}">
-        <p14:creationId xmlns:p14="http://schemas.microsoft.com/office/powerpoint/2010/main" val="2030585090"/>
+        <p14:creationId xmlns:p14="http://schemas.microsoft.com/office/powerpoint/2010/main" val="1518102087"/>
       </p:ext>
     </p:extLst>
   </p:cSld>
@@ -1788,123 +1867,148 @@
           <a:lstStyle/>
           <a:p>
             <a:r>
+              <a:rPr lang="en-US" dirty="0"/>
+              <a:t>Python is dynamically-typed and garbage-collected. It supports multiple programming paradigms, including structured (particularly, procedural), object-oriented and functional programming.</a:t>
+            </a:r>
+          </a:p>
+          <a:p>
+            <a:endParaRPr lang="en-US" sz="1200" dirty="0">
+              <a:cs typeface="Calibri"/>
+            </a:endParaRPr>
+          </a:p>
+          <a:p>
+            <a:r>
               <a:rPr lang="en-US" dirty="0">
-                <a:solidFill>
-                  <a:srgbClr val="000000"/>
-                </a:solidFill>
-                <a:latin typeface="Tahoma"/>
-                <a:ea typeface="Tahoma"/>
-                <a:cs typeface="Tahoma"/>
-              </a:rPr>
-              <a:t>PyCharm is currently one of the most used IDE for python development, It provides code analysis, a graphical debugger, an integrated unit tester, integration with version control systems (VCSes), and supports web development with Django as well as data science with Anaconda.</a:t>
-            </a:r>
-          </a:p>
-          <a:p>
+                <a:cs typeface="Calibri"/>
+              </a:rPr>
+              <a:t>It was built to be as readable as possible, and is </a:t>
+            </a:r>
+            <a:r>
+              <a:rPr lang="en-US" dirty="0"/>
+              <a:t>significant indentation driven (Off-side rule).</a:t>
+            </a:r>
             <a:endParaRPr lang="en-US" dirty="0">
-              <a:solidFill>
-                <a:srgbClr val="000000"/>
-              </a:solidFill>
-              <a:latin typeface="Tahoma"/>
-              <a:ea typeface="Tahoma"/>
-              <a:cs typeface="Tahoma"/>
+              <a:cs typeface="Calibri"/>
             </a:endParaRPr>
           </a:p>
           <a:p>
-            <a:r>
-              <a:rPr lang="en-US" dirty="0">
-                <a:solidFill>
-                  <a:srgbClr val="000000"/>
-                </a:solidFill>
-                <a:latin typeface="Tahoma"/>
-                <a:ea typeface="Tahoma"/>
-                <a:cs typeface="Tahoma"/>
-              </a:rPr>
-              <a:t>It was created by JetBrains</a:t>
-            </a:r>
-          </a:p>
-          <a:p>
+            <a:pPr algn="l" rtl="0" eaLnBrk="1" hangingPunct="1"/>
+            <a:endParaRPr lang="en-US"/>
+          </a:p>
+          <a:p>
+            <a:r>
+              <a:rPr lang="en-US" dirty="0"/>
+              <a:t>The language's core philosophy is summarized in the document </a:t>
+            </a:r>
+            <a:r>
+              <a:rPr lang="en-US" i="1" dirty="0"/>
+              <a:t>The Zen of Python</a:t>
+            </a:r>
+            <a:r>
+              <a:rPr lang="en-US" dirty="0"/>
+              <a:t> (</a:t>
+            </a:r>
+            <a:r>
+              <a:rPr lang="en-US" i="1" dirty="0"/>
+              <a:t>PEP 20</a:t>
+            </a:r>
+            <a:r>
+              <a:rPr lang="en-US" dirty="0"/>
+              <a:t>), which includes aphorisms such as:</a:t>
+            </a:r>
             <a:endParaRPr lang="en-US" dirty="0">
-              <a:solidFill>
-                <a:srgbClr val="000000"/>
-              </a:solidFill>
-              <a:latin typeface="Tahoma"/>
-              <a:ea typeface="Tahoma"/>
-              <a:cs typeface="Tahoma"/>
+              <a:cs typeface="Calibri"/>
             </a:endParaRPr>
           </a:p>
           <a:p>
-            <a:r>
-              <a:rPr lang="en-US" dirty="0">
-                <a:solidFill>
-                  <a:srgbClr val="000000"/>
-                </a:solidFill>
-                <a:latin typeface="Tahoma"/>
-                <a:ea typeface="Tahoma"/>
-                <a:cs typeface="Tahoma"/>
-              </a:rPr>
-              <a:t>It is mostly popular because of many things, such as:</a:t>
-            </a:r>
-          </a:p>
-          <a:p>
-            <a:pPr marL="171450" indent="-171450">
+            <a:pPr marL="285750" indent="-285750">
               <a:buFont typeface="Arial"/>
               <a:buChar char="•"/>
             </a:pPr>
             <a:r>
-              <a:rPr lang="en-US" dirty="0">
-                <a:solidFill>
-                  <a:srgbClr val="000000"/>
-                </a:solidFill>
-                <a:latin typeface="Tahoma"/>
-                <a:ea typeface="Tahoma"/>
-                <a:cs typeface="Tahoma"/>
-              </a:rPr>
-              <a:t>It is considered as an intelligent code editor, fast and safe refactoring, and smart code.</a:t>
-            </a:r>
-          </a:p>
-          <a:p>
-            <a:pPr marL="171450" indent="-171450">
+              <a:rPr lang="en-US" dirty="0"/>
+              <a:t>Beautiful is better than ugly.</a:t>
+            </a:r>
+            <a:endParaRPr lang="en-US" dirty="0">
+              <a:cs typeface="Calibri"/>
+            </a:endParaRPr>
+          </a:p>
+          <a:p>
+            <a:pPr marL="285750" indent="-285750">
               <a:buFont typeface="Arial"/>
               <a:buChar char="•"/>
             </a:pPr>
             <a:r>
-              <a:rPr lang="en-US" dirty="0">
-                <a:solidFill>
-                  <a:srgbClr val="000000"/>
-                </a:solidFill>
-                <a:latin typeface="Tahoma"/>
-                <a:ea typeface="Tahoma"/>
-                <a:cs typeface="Tahoma"/>
-              </a:rPr>
-              <a:t>Features for debugging, profiling, remote development, testing the code, auto code completion, quick fixing, error detection and tools of the database.</a:t>
-            </a:r>
-          </a:p>
-          <a:p>
-            <a:pPr marL="171450" indent="-171450">
+              <a:rPr lang="en-US" dirty="0"/>
+              <a:t>Explicit is better than implicit.</a:t>
+            </a:r>
+            <a:endParaRPr lang="en-US" dirty="0">
+              <a:cs typeface="Calibri"/>
+            </a:endParaRPr>
+          </a:p>
+          <a:p>
+            <a:pPr marL="285750" indent="-285750">
               <a:buFont typeface="Arial"/>
               <a:buChar char="•"/>
             </a:pPr>
             <a:r>
+              <a:rPr lang="en-US" dirty="0"/>
+              <a:t>Simple is better than complex.</a:t>
+            </a:r>
+            <a:endParaRPr lang="en-US" dirty="0">
+              <a:cs typeface="Calibri"/>
+            </a:endParaRPr>
+          </a:p>
+          <a:p>
+            <a:pPr marL="285750" indent="-285750">
+              <a:buFont typeface="Arial"/>
+              <a:buChar char="•"/>
+            </a:pPr>
+            <a:r>
+              <a:rPr lang="en-US" dirty="0"/>
+              <a:t>Complex is better than complicated.</a:t>
+            </a:r>
+            <a:endParaRPr lang="en-US" dirty="0">
+              <a:cs typeface="Calibri"/>
+            </a:endParaRPr>
+          </a:p>
+          <a:p>
+            <a:pPr marL="285750" indent="-285750">
+              <a:buFont typeface="Arial"/>
+              <a:buChar char="•"/>
+            </a:pPr>
+            <a:r>
+              <a:rPr lang="en-US" dirty="0"/>
+              <a:t>Readability counts.</a:t>
+            </a:r>
+            <a:endParaRPr lang="en-US" dirty="0">
+              <a:cs typeface="Calibri"/>
+            </a:endParaRPr>
+          </a:p>
+          <a:p>
+            <a:pPr algn="l"/>
+            <a:endParaRPr lang="en-US" dirty="0">
+              <a:cs typeface="Calibri"/>
+            </a:endParaRPr>
+          </a:p>
+          <a:p>
+            <a:endParaRPr lang="en-US" u="sng"/>
+          </a:p>
+          <a:p>
+            <a:pPr algn="l" rtl="0" eaLnBrk="1" hangingPunct="1"/>
+            <a:r>
+              <a:rPr lang="en-US" u="sng" dirty="0"/>
+              <a:t>For further reading:</a:t>
+            </a:r>
+          </a:p>
+          <a:p>
+            <a:r>
               <a:rPr lang="en-US" dirty="0">
-                <a:solidFill>
-                  <a:srgbClr val="000000"/>
-                </a:solidFill>
-                <a:latin typeface="Tahoma"/>
-                <a:ea typeface="Tahoma"/>
-                <a:cs typeface="Tahoma"/>
-              </a:rPr>
-              <a:t>Support for Popular web technologies, web frameworks, scientific libraries and version control. </a:t>
-            </a:r>
-          </a:p>
-          <a:p>
-            <a:endParaRPr lang="en-US" dirty="0">
-              <a:solidFill>
-                <a:srgbClr val="000000"/>
-              </a:solidFill>
-              <a:latin typeface="Tahoma"/>
-              <a:ea typeface="Tahoma"/>
-              <a:cs typeface="Tahoma"/>
-            </a:endParaRPr>
+                <a:hlinkClick r:id="rId3"/>
+              </a:rPr>
+              <a:t>Python (programming language) - Wikipedia</a:t>
+            </a:r>
+            <a:endParaRPr lang="en-US"/>
           </a:p>
         </p:txBody>
       </p:sp>
@@ -1926,7 +2030,7 @@
             <a:fld id="{C18343ED-3762-4D46-A439-B4D407E13EF8}" type="slidenum">
               <a:rPr lang="en-US" smtClean="0"/>
               <a:pPr/>
-              <a:t>9</a:t>
+              <a:t>5</a:t>
             </a:fld>
             <a:endParaRPr lang="en-US"/>
           </a:p>
@@ -1935,7 +2039,7 @@
     </p:spTree>
     <p:extLst>
       <p:ext uri="{BB962C8B-B14F-4D97-AF65-F5344CB8AC3E}">
-        <p14:creationId xmlns:p14="http://schemas.microsoft.com/office/powerpoint/2010/main" val="3013686146"/>
+        <p14:creationId xmlns:p14="http://schemas.microsoft.com/office/powerpoint/2010/main" val="2030585090"/>
       </p:ext>
     </p:extLst>
   </p:cSld>
@@ -2128,7 +2232,7 @@
             <a:fld id="{C18343ED-3762-4D46-A439-B4D407E13EF8}" type="slidenum">
               <a:rPr lang="en-US" smtClean="0"/>
               <a:pPr/>
-              <a:t>10</a:t>
+              <a:t>9</a:t>
             </a:fld>
             <a:endParaRPr lang="en-US"/>
           </a:p>
@@ -2137,7 +2241,7 @@
     </p:spTree>
     <p:extLst>
       <p:ext uri="{BB962C8B-B14F-4D97-AF65-F5344CB8AC3E}">
-        <p14:creationId xmlns:p14="http://schemas.microsoft.com/office/powerpoint/2010/main" val="4088648762"/>
+        <p14:creationId xmlns:p14="http://schemas.microsoft.com/office/powerpoint/2010/main" val="3013686146"/>
       </p:ext>
     </p:extLst>
   </p:cSld>
@@ -2330,7 +2434,7 @@
             <a:fld id="{C18343ED-3762-4D46-A439-B4D407E13EF8}" type="slidenum">
               <a:rPr lang="en-US" smtClean="0"/>
               <a:pPr/>
-              <a:t>12</a:t>
+              <a:t>10</a:t>
             </a:fld>
             <a:endParaRPr lang="en-US"/>
           </a:p>
@@ -2339,7 +2443,7 @@
     </p:spTree>
     <p:extLst>
       <p:ext uri="{BB962C8B-B14F-4D97-AF65-F5344CB8AC3E}">
-        <p14:creationId xmlns:p14="http://schemas.microsoft.com/office/powerpoint/2010/main" val="1157867576"/>
+        <p14:creationId xmlns:p14="http://schemas.microsoft.com/office/powerpoint/2010/main" val="4088648762"/>
       </p:ext>
     </p:extLst>
   </p:cSld>
@@ -2532,7 +2636,7 @@
             <a:fld id="{C18343ED-3762-4D46-A439-B4D407E13EF8}" type="slidenum">
               <a:rPr lang="en-US" smtClean="0"/>
               <a:pPr/>
-              <a:t>13</a:t>
+              <a:t>12</a:t>
             </a:fld>
             <a:endParaRPr lang="en-US"/>
           </a:p>
@@ -2541,7 +2645,7 @@
     </p:spTree>
     <p:extLst>
       <p:ext uri="{BB962C8B-B14F-4D97-AF65-F5344CB8AC3E}">
-        <p14:creationId xmlns:p14="http://schemas.microsoft.com/office/powerpoint/2010/main" val="849729191"/>
+        <p14:creationId xmlns:p14="http://schemas.microsoft.com/office/powerpoint/2010/main" val="1157867576"/>
       </p:ext>
     </p:extLst>
   </p:cSld>
@@ -2734,7 +2838,7 @@
             <a:fld id="{C18343ED-3762-4D46-A439-B4D407E13EF8}" type="slidenum">
               <a:rPr lang="en-US" smtClean="0"/>
               <a:pPr/>
-              <a:t>15</a:t>
+              <a:t>13</a:t>
             </a:fld>
             <a:endParaRPr lang="en-US"/>
           </a:p>
@@ -2743,7 +2847,7 @@
     </p:spTree>
     <p:extLst>
       <p:ext uri="{BB962C8B-B14F-4D97-AF65-F5344CB8AC3E}">
-        <p14:creationId xmlns:p14="http://schemas.microsoft.com/office/powerpoint/2010/main" val="2779813135"/>
+        <p14:creationId xmlns:p14="http://schemas.microsoft.com/office/powerpoint/2010/main" val="849729191"/>
       </p:ext>
     </p:extLst>
   </p:cSld>
@@ -2936,7 +3040,7 @@
             <a:fld id="{C18343ED-3762-4D46-A439-B4D407E13EF8}" type="slidenum">
               <a:rPr lang="en-US" smtClean="0"/>
               <a:pPr/>
-              <a:t>16</a:t>
+              <a:t>15</a:t>
             </a:fld>
             <a:endParaRPr lang="en-US"/>
           </a:p>
@@ -2945,7 +3049,7 @@
     </p:spTree>
     <p:extLst>
       <p:ext uri="{BB962C8B-B14F-4D97-AF65-F5344CB8AC3E}">
-        <p14:creationId xmlns:p14="http://schemas.microsoft.com/office/powerpoint/2010/main" val="89710469"/>
+        <p14:creationId xmlns:p14="http://schemas.microsoft.com/office/powerpoint/2010/main" val="2779813135"/>
       </p:ext>
     </p:extLst>
   </p:cSld>
@@ -3104,7 +3208,7 @@
           <a:p>
             <a:fld id="{A9D9B7D1-305C-49A9-9D59-000E5D30F1FD}" type="datetimeFigureOut">
               <a:rPr lang="he-IL" smtClean="0"/>
-              <a:t>י"ט/תמוז/תשפ"ג</a:t>
+              <a:t>כ'/תמוז/תשפ"ג</a:t>
             </a:fld>
             <a:endParaRPr lang="he-IL"/>
           </a:p>
@@ -3304,7 +3408,7 @@
           <a:p>
             <a:fld id="{A9D9B7D1-305C-49A9-9D59-000E5D30F1FD}" type="datetimeFigureOut">
               <a:rPr lang="he-IL" smtClean="0"/>
-              <a:t>י"ט/תמוז/תשפ"ג</a:t>
+              <a:t>כ'/תמוז/תשפ"ג</a:t>
             </a:fld>
             <a:endParaRPr lang="he-IL"/>
           </a:p>
@@ -3514,7 +3618,7 @@
           <a:p>
             <a:fld id="{A9D9B7D1-305C-49A9-9D59-000E5D30F1FD}" type="datetimeFigureOut">
               <a:rPr lang="he-IL" smtClean="0"/>
-              <a:t>י"ט/תמוז/תשפ"ג</a:t>
+              <a:t>כ'/תמוז/תשפ"ג</a:t>
             </a:fld>
             <a:endParaRPr lang="he-IL"/>
           </a:p>
@@ -3588,298 +3692,6 @@
 </file>
 
 <file path=ppt/slideLayouts/slideLayout12.xml><?xml version="1.0" encoding="utf-8"?>
-<p:sldLayout xmlns:a="http://schemas.openxmlformats.org/drawingml/2006/main" xmlns:r="http://schemas.openxmlformats.org/officeDocument/2006/relationships" xmlns:p="http://schemas.openxmlformats.org/presentationml/2006/main" userDrawn="1">
-  <p:cSld name="1_Title Slide">
-    <p:spTree>
-      <p:nvGrpSpPr>
-        <p:cNvPr id="1" name=""/>
-        <p:cNvGrpSpPr/>
-        <p:nvPr/>
-      </p:nvGrpSpPr>
-      <p:grpSpPr>
-        <a:xfrm>
-          <a:off x="0" y="0"/>
-          <a:ext cx="0" cy="0"/>
-          <a:chOff x="0" y="0"/>
-          <a:chExt cx="0" cy="0"/>
-        </a:xfrm>
-      </p:grpSpPr>
-      <p:sp>
-        <p:nvSpPr>
-          <p:cNvPr id="2" name="Title 1"/>
-          <p:cNvSpPr>
-            <a:spLocks noGrp="1"/>
-          </p:cNvSpPr>
-          <p:nvPr>
-            <p:ph type="ctrTitle"/>
-          </p:nvPr>
-        </p:nvSpPr>
-        <p:spPr>
-          <a:xfrm>
-            <a:off x="774049" y="1340768"/>
-            <a:ext cx="9850763" cy="1085850"/>
-          </a:xfrm>
-        </p:spPr>
-        <p:txBody>
-          <a:bodyPr vert="horz" lIns="0" tIns="45720" rIns="91440" bIns="45720" rtlCol="0" anchor="t" anchorCtr="0">
-            <a:normAutofit/>
-          </a:bodyPr>
-          <a:lstStyle>
-            <a:lvl1pPr>
-              <a:defRPr lang="en-US" sz="3200" dirty="0">
-                <a:ln w="3175">
-                  <a:noFill/>
-                </a:ln>
-              </a:defRPr>
-            </a:lvl1pPr>
-          </a:lstStyle>
-          <a:p>
-            <a:pPr lvl="0"/>
-            <a:r>
-              <a:rPr lang="en-US"/>
-              <a:t>Click to edit Master title style</a:t>
-            </a:r>
-          </a:p>
-        </p:txBody>
-      </p:sp>
-      <p:sp>
-        <p:nvSpPr>
-          <p:cNvPr id="11" name="TextBox 10"/>
-          <p:cNvSpPr txBox="1"/>
-          <p:nvPr userDrawn="1"/>
-        </p:nvSpPr>
-        <p:spPr>
-          <a:xfrm>
-            <a:off x="774050" y="6362070"/>
-            <a:ext cx="10506527" cy="261610"/>
-          </a:xfrm>
-          <a:prstGeom prst="rect">
-            <a:avLst/>
-          </a:prstGeom>
-          <a:noFill/>
-        </p:spPr>
-        <p:txBody>
-          <a:bodyPr wrap="square" lIns="0" rtlCol="0">
-            <a:spAutoFit/>
-          </a:bodyPr>
-          <a:lstStyle/>
-          <a:p>
-            <a:pPr algn="l"/>
-            <a:r>
-              <a:rPr lang="en-US" sz="1100" kern="1200">
-                <a:solidFill>
-                  <a:schemeClr val="tx1">
-                    <a:lumMod val="85000"/>
-                    <a:lumOff val="15000"/>
-                  </a:schemeClr>
-                </a:solidFill>
-                <a:latin typeface="Segoe" panose="020B0502040504020203" pitchFamily="34" charset="0"/>
-                <a:ea typeface="+mn-ea"/>
-                <a:cs typeface="+mn-cs"/>
-              </a:rPr>
-              <a:t>Copyright © SELA Software &amp; Education Labs, Ltd. | 14-18 Baruch Hirsch St., </a:t>
-            </a:r>
-            <a:r>
-              <a:rPr lang="en-US" sz="1100" kern="1200" err="1">
-                <a:solidFill>
-                  <a:schemeClr val="tx1">
-                    <a:lumMod val="85000"/>
-                    <a:lumOff val="15000"/>
-                  </a:schemeClr>
-                </a:solidFill>
-                <a:latin typeface="Segoe" panose="020B0502040504020203" pitchFamily="34" charset="0"/>
-                <a:ea typeface="+mn-ea"/>
-                <a:cs typeface="+mn-cs"/>
-              </a:rPr>
-              <a:t>Bnei</a:t>
-            </a:r>
-            <a:r>
-              <a:rPr lang="en-US" sz="1100" kern="1200">
-                <a:solidFill>
-                  <a:schemeClr val="tx1">
-                    <a:lumMod val="85000"/>
-                    <a:lumOff val="15000"/>
-                  </a:schemeClr>
-                </a:solidFill>
-                <a:latin typeface="Segoe" panose="020B0502040504020203" pitchFamily="34" charset="0"/>
-                <a:ea typeface="+mn-ea"/>
-                <a:cs typeface="+mn-cs"/>
-              </a:rPr>
-              <a:t> </a:t>
-            </a:r>
-            <a:r>
-              <a:rPr lang="en-US" sz="1100" kern="1200" err="1">
-                <a:solidFill>
-                  <a:schemeClr val="tx1">
-                    <a:lumMod val="85000"/>
-                    <a:lumOff val="15000"/>
-                  </a:schemeClr>
-                </a:solidFill>
-                <a:latin typeface="Segoe" panose="020B0502040504020203" pitchFamily="34" charset="0"/>
-                <a:ea typeface="+mn-ea"/>
-                <a:cs typeface="+mn-cs"/>
-              </a:rPr>
-              <a:t>Brak</a:t>
-            </a:r>
-            <a:r>
-              <a:rPr lang="en-US" sz="1100" kern="1200">
-                <a:solidFill>
-                  <a:schemeClr val="tx1">
-                    <a:lumMod val="85000"/>
-                    <a:lumOff val="15000"/>
-                  </a:schemeClr>
-                </a:solidFill>
-                <a:latin typeface="Segoe" panose="020B0502040504020203" pitchFamily="34" charset="0"/>
-                <a:ea typeface="+mn-ea"/>
-                <a:cs typeface="+mn-cs"/>
-              </a:rPr>
-              <a:t> 51202, Israel | www.selagroup.com</a:t>
-            </a:r>
-            <a:endParaRPr lang="en-US" sz="800">
-              <a:solidFill>
-                <a:schemeClr val="tx1">
-                  <a:lumMod val="85000"/>
-                  <a:lumOff val="15000"/>
-                </a:schemeClr>
-              </a:solidFill>
-              <a:latin typeface="Segoe" panose="020B0502040504020203" pitchFamily="34" charset="0"/>
-            </a:endParaRPr>
-          </a:p>
-        </p:txBody>
-      </p:sp>
-      <p:pic>
-        <p:nvPicPr>
-          <p:cNvPr id="13" name="Picture 12"/>
-          <p:cNvPicPr>
-            <a:picLocks noChangeAspect="1"/>
-          </p:cNvPicPr>
-          <p:nvPr userDrawn="1"/>
-        </p:nvPicPr>
-        <p:blipFill>
-          <a:blip r:embed="rId2" cstate="print">
-            <a:extLst>
-              <a:ext uri="{28A0092B-C50C-407E-A947-70E740481C1C}">
-                <a14:useLocalDpi xmlns:a14="http://schemas.microsoft.com/office/drawing/2010/main" val="0"/>
-              </a:ext>
-            </a:extLst>
-          </a:blip>
-          <a:stretch>
-            <a:fillRect/>
-          </a:stretch>
-        </p:blipFill>
-        <p:spPr>
-          <a:xfrm>
-            <a:off x="774050" y="534798"/>
-            <a:ext cx="3509932" cy="483907"/>
-          </a:xfrm>
-          <a:prstGeom prst="rect">
-            <a:avLst/>
-          </a:prstGeom>
-        </p:spPr>
-      </p:pic>
-      <p:sp>
-        <p:nvSpPr>
-          <p:cNvPr id="7" name="Text Placeholder 6"/>
-          <p:cNvSpPr>
-            <a:spLocks noGrp="1"/>
-          </p:cNvSpPr>
-          <p:nvPr>
-            <p:ph type="body" sz="quarter" idx="10"/>
-          </p:nvPr>
-        </p:nvSpPr>
-        <p:spPr>
-          <a:xfrm>
-            <a:off x="774701" y="2427289"/>
-            <a:ext cx="9850967" cy="1362075"/>
-          </a:xfrm>
-          <a:prstGeom prst="rect">
-            <a:avLst/>
-          </a:prstGeom>
-        </p:spPr>
-        <p:txBody>
-          <a:bodyPr/>
-          <a:lstStyle>
-            <a:lvl1pPr marL="0" marR="0" indent="0" algn="l" defTabSz="914400" rtl="0" eaLnBrk="1" fontAlgn="auto" latinLnBrk="0" hangingPunct="1">
-              <a:lnSpc>
-                <a:spcPct val="100000"/>
-              </a:lnSpc>
-              <a:spcBef>
-                <a:spcPct val="20000"/>
-              </a:spcBef>
-              <a:spcAft>
-                <a:spcPts val="0"/>
-              </a:spcAft>
-              <a:buClrTx/>
-              <a:buSzTx/>
-              <a:buFontTx/>
-              <a:buNone/>
-              <a:tabLst/>
-              <a:defRPr>
-                <a:solidFill>
-                  <a:srgbClr val="E89636"/>
-                </a:solidFill>
-              </a:defRPr>
-            </a:lvl1pPr>
-            <a:lvl2pPr marL="457200" indent="0" algn="l" rtl="0">
-              <a:buFontTx/>
-              <a:buNone/>
-              <a:defRPr/>
-            </a:lvl2pPr>
-            <a:lvl3pPr marL="914400" indent="0" algn="l" rtl="0">
-              <a:buFontTx/>
-              <a:buNone/>
-              <a:defRPr/>
-            </a:lvl3pPr>
-            <a:lvl4pPr marL="1371600" indent="0" algn="l" rtl="0">
-              <a:buFontTx/>
-              <a:buNone/>
-              <a:defRPr/>
-            </a:lvl4pPr>
-            <a:lvl5pPr marL="1828800" indent="0" algn="l" rtl="0">
-              <a:buFontTx/>
-              <a:buNone/>
-              <a:defRPr/>
-            </a:lvl5pPr>
-          </a:lstStyle>
-          <a:p>
-            <a:pPr lvl="0"/>
-            <a:r>
-              <a:rPr lang="en-US"/>
-              <a:t>Click to edit Master text styles</a:t>
-            </a:r>
-          </a:p>
-        </p:txBody>
-      </p:sp>
-    </p:spTree>
-    <p:extLst>
-      <p:ext uri="{BB962C8B-B14F-4D97-AF65-F5344CB8AC3E}">
-        <p14:creationId xmlns:p14="http://schemas.microsoft.com/office/powerpoint/2010/main" val="2797336940"/>
-      </p:ext>
-    </p:extLst>
-  </p:cSld>
-  <p:clrMapOvr>
-    <a:masterClrMapping/>
-  </p:clrMapOvr>
-  <p:extLst>
-    <p:ext uri="{DCECCB84-F9BA-43D5-87BE-67443E8EF086}">
-      <p15:sldGuideLst xmlns:p15="http://schemas.microsoft.com/office/powerpoint/2012/main">
-        <p15:guide id="1" orient="horz" pos="789">
-          <p15:clr>
-            <a:srgbClr val="FBAE40"/>
-          </p15:clr>
-        </p15:guide>
-        <p15:guide id="2" pos="612">
-          <p15:clr>
-            <a:srgbClr val="FBAE40"/>
-          </p15:clr>
-        </p15:guide>
-      </p15:sldGuideLst>
-    </p:ext>
-  </p:extLst>
-</p:sldLayout>
-</file>
-
-<file path=ppt/slideLayouts/slideLayout13.xml><?xml version="1.0" encoding="utf-8"?>
 <p:sldLayout xmlns:a="http://schemas.openxmlformats.org/drawingml/2006/main" xmlns:r="http://schemas.openxmlformats.org/officeDocument/2006/relationships" xmlns:p="http://schemas.openxmlformats.org/presentationml/2006/main" userDrawn="1">
   <p:cSld name="ModuleAgenda">
     <p:spTree>
@@ -4006,7 +3818,7 @@
 </p:sldLayout>
 </file>
 
-<file path=ppt/slideLayouts/slideLayout14.xml><?xml version="1.0" encoding="utf-8"?>
+<file path=ppt/slideLayouts/slideLayout13.xml><?xml version="1.0" encoding="utf-8"?>
 <p:sldLayout xmlns:a="http://schemas.openxmlformats.org/drawingml/2006/main" xmlns:r="http://schemas.openxmlformats.org/officeDocument/2006/relationships" xmlns:p="http://schemas.openxmlformats.org/presentationml/2006/main" userDrawn="1">
   <p:cSld name="Demo Page">
     <p:spTree>
@@ -4523,7 +4335,7 @@
 </p:sldLayout>
 </file>
 
-<file path=ppt/slideLayouts/slideLayout15.xml><?xml version="1.0" encoding="utf-8"?>
+<file path=ppt/slideLayouts/slideLayout14.xml><?xml version="1.0" encoding="utf-8"?>
 <p:sldLayout xmlns:a="http://schemas.openxmlformats.org/drawingml/2006/main" xmlns:r="http://schemas.openxmlformats.org/officeDocument/2006/relationships" xmlns:p="http://schemas.openxmlformats.org/presentationml/2006/main" userDrawn="1">
   <p:cSld name="Lab">
     <p:spTree>
@@ -5040,7 +4852,7 @@
 </p:sldLayout>
 </file>
 
-<file path=ppt/slideLayouts/slideLayout16.xml><?xml version="1.0" encoding="utf-8"?>
+<file path=ppt/slideLayouts/slideLayout15.xml><?xml version="1.0" encoding="utf-8"?>
 <p:sldLayout xmlns:a="http://schemas.openxmlformats.org/drawingml/2006/main" xmlns:r="http://schemas.openxmlformats.org/officeDocument/2006/relationships" xmlns:p="http://schemas.openxmlformats.org/presentationml/2006/main" userDrawn="1">
   <p:cSld name="Questions">
     <p:spTree>
@@ -5521,6 +5333,63 @@
 </p:sldLayout>
 </file>
 
+<file path=ppt/slideLayouts/slideLayout16.xml><?xml version="1.0" encoding="utf-8"?>
+<p:sldLayout xmlns:a="http://schemas.openxmlformats.org/drawingml/2006/main" xmlns:r="http://schemas.openxmlformats.org/officeDocument/2006/relationships" xmlns:p="http://schemas.openxmlformats.org/presentationml/2006/main" matchingName="6_Title Slide">
+  <p:cSld name="6_Title Slide">
+    <p:spTree>
+      <p:nvGrpSpPr>
+        <p:cNvPr id="1" name="Shape 16"/>
+        <p:cNvGrpSpPr/>
+        <p:nvPr/>
+      </p:nvGrpSpPr>
+      <p:grpSpPr>
+        <a:xfrm>
+          <a:off x="0" y="0"/>
+          <a:ext cx="0" cy="0"/>
+          <a:chOff x="0" y="0"/>
+          <a:chExt cx="0" cy="0"/>
+        </a:xfrm>
+      </p:grpSpPr>
+      <p:pic>
+        <p:nvPicPr>
+          <p:cNvPr id="17" name="Google Shape;17;p10"/>
+          <p:cNvPicPr preferRelativeResize="0"/>
+          <p:nvPr/>
+        </p:nvPicPr>
+        <p:blipFill rotWithShape="1">
+          <a:blip r:embed="rId2">
+            <a:alphaModFix/>
+          </a:blip>
+          <a:srcRect/>
+          <a:stretch/>
+        </p:blipFill>
+        <p:spPr>
+          <a:xfrm>
+            <a:off x="10668000" y="5981612"/>
+            <a:ext cx="1246029" cy="511263"/>
+          </a:xfrm>
+          <a:prstGeom prst="rect">
+            <a:avLst/>
+          </a:prstGeom>
+          <a:noFill/>
+          <a:ln>
+            <a:noFill/>
+          </a:ln>
+        </p:spPr>
+      </p:pic>
+    </p:spTree>
+    <p:extLst>
+      <p:ext uri="{BB962C8B-B14F-4D97-AF65-F5344CB8AC3E}">
+        <p14:creationId xmlns:p14="http://schemas.microsoft.com/office/powerpoint/2010/main" val="2913808016"/>
+      </p:ext>
+    </p:extLst>
+  </p:cSld>
+  <p:clrMapOvr>
+    <a:masterClrMapping/>
+  </p:clrMapOvr>
+</p:sldLayout>
+</file>
+
 <file path=ppt/slideLayouts/slideLayout2.xml><?xml version="1.0" encoding="utf-8"?>
 <p:sldLayout xmlns:a="http://schemas.openxmlformats.org/drawingml/2006/main" xmlns:r="http://schemas.openxmlformats.org/officeDocument/2006/relationships" xmlns:p="http://schemas.openxmlformats.org/presentationml/2006/main" type="obj" preserve="1">
   <p:cSld name="Title and Content">
@@ -5648,7 +5517,7 @@
           <a:p>
             <a:fld id="{A9D9B7D1-305C-49A9-9D59-000E5D30F1FD}" type="datetimeFigureOut">
               <a:rPr lang="he-IL" smtClean="0"/>
-              <a:t>י"ט/תמוז/תשפ"ג</a:t>
+              <a:t>כ'/תמוז/תשפ"ג</a:t>
             </a:fld>
             <a:endParaRPr lang="he-IL"/>
           </a:p>
@@ -5924,7 +5793,7 @@
           <a:p>
             <a:fld id="{A9D9B7D1-305C-49A9-9D59-000E5D30F1FD}" type="datetimeFigureOut">
               <a:rPr lang="he-IL" smtClean="0"/>
-              <a:t>י"ט/תמוז/תשפ"ג</a:t>
+              <a:t>כ'/תמוז/תשפ"ג</a:t>
             </a:fld>
             <a:endParaRPr lang="he-IL"/>
           </a:p>
@@ -6192,7 +6061,7 @@
           <a:p>
             <a:fld id="{A9D9B7D1-305C-49A9-9D59-000E5D30F1FD}" type="datetimeFigureOut">
               <a:rPr lang="he-IL" smtClean="0"/>
-              <a:t>י"ט/תמוז/תשפ"ג</a:t>
+              <a:t>כ'/תמוז/תשפ"ג</a:t>
             </a:fld>
             <a:endParaRPr lang="he-IL"/>
           </a:p>
@@ -6607,7 +6476,7 @@
           <a:p>
             <a:fld id="{A9D9B7D1-305C-49A9-9D59-000E5D30F1FD}" type="datetimeFigureOut">
               <a:rPr lang="he-IL" smtClean="0"/>
-              <a:t>י"ט/תמוז/תשפ"ג</a:t>
+              <a:t>כ'/תמוז/תשפ"ג</a:t>
             </a:fld>
             <a:endParaRPr lang="he-IL"/>
           </a:p>
@@ -6749,7 +6618,7 @@
           <a:p>
             <a:fld id="{A9D9B7D1-305C-49A9-9D59-000E5D30F1FD}" type="datetimeFigureOut">
               <a:rPr lang="he-IL" smtClean="0"/>
-              <a:t>י"ט/תמוז/תשפ"ג</a:t>
+              <a:t>כ'/תמוז/תשפ"ג</a:t>
             </a:fld>
             <a:endParaRPr lang="he-IL"/>
           </a:p>
@@ -6862,7 +6731,7 @@
           <a:p>
             <a:fld id="{A9D9B7D1-305C-49A9-9D59-000E5D30F1FD}" type="datetimeFigureOut">
               <a:rPr lang="he-IL" smtClean="0"/>
-              <a:t>י"ט/תמוז/תשפ"ג</a:t>
+              <a:t>כ'/תמוז/תשפ"ג</a:t>
             </a:fld>
             <a:endParaRPr lang="he-IL"/>
           </a:p>
@@ -7175,7 +7044,7 @@
           <a:p>
             <a:fld id="{A9D9B7D1-305C-49A9-9D59-000E5D30F1FD}" type="datetimeFigureOut">
               <a:rPr lang="he-IL" smtClean="0"/>
-              <a:t>י"ט/תמוז/תשפ"ג</a:t>
+              <a:t>כ'/תמוז/תשפ"ג</a:t>
             </a:fld>
             <a:endParaRPr lang="he-IL"/>
           </a:p>
@@ -7464,7 +7333,7 @@
           <a:p>
             <a:fld id="{A9D9B7D1-305C-49A9-9D59-000E5D30F1FD}" type="datetimeFigureOut">
               <a:rPr lang="he-IL" smtClean="0"/>
-              <a:t>י"ט/תמוז/תשפ"ג</a:t>
+              <a:t>כ'/תמוז/תשפ"ג</a:t>
             </a:fld>
             <a:endParaRPr lang="he-IL"/>
           </a:p>
@@ -7707,7 +7576,7 @@
           <a:p>
             <a:fld id="{A9D9B7D1-305C-49A9-9D59-000E5D30F1FD}" type="datetimeFigureOut">
               <a:rPr lang="he-IL" smtClean="0"/>
-              <a:t>י"ט/תמוז/תשפ"ג</a:t>
+              <a:t>כ'/תמוז/תשפ"ג</a:t>
             </a:fld>
             <a:endParaRPr lang="he-IL"/>
           </a:p>
@@ -7823,11 +7692,11 @@
     <p:sldLayoutId id="2147483657" r:id="rId9"/>
     <p:sldLayoutId id="2147483658" r:id="rId10"/>
     <p:sldLayoutId id="2147483659" r:id="rId11"/>
-    <p:sldLayoutId id="2147483660" r:id="rId12"/>
-    <p:sldLayoutId id="2147483661" r:id="rId13"/>
-    <p:sldLayoutId id="2147483665" r:id="rId14"/>
-    <p:sldLayoutId id="2147483667" r:id="rId15"/>
-    <p:sldLayoutId id="2147483670" r:id="rId16"/>
+    <p:sldLayoutId id="2147483661" r:id="rId12"/>
+    <p:sldLayoutId id="2147483665" r:id="rId13"/>
+    <p:sldLayoutId id="2147483667" r:id="rId14"/>
+    <p:sldLayoutId id="2147483670" r:id="rId15"/>
+    <p:sldLayoutId id="2147483671" r:id="rId16"/>
   </p:sldLayoutIdLst>
   <p:txStyles>
     <p:titleStyle>
@@ -8117,7 +7986,7 @@
   <p:cSld>
     <p:spTree>
       <p:nvGrpSpPr>
-        <p:cNvPr id="1" name=""/>
+        <p:cNvPr id="1" name="Shape 161"/>
         <p:cNvGrpSpPr/>
         <p:nvPr/>
       </p:nvGrpSpPr>
@@ -8131,50 +8000,501 @@
       </p:grpSpPr>
       <p:sp>
         <p:nvSpPr>
-          <p:cNvPr id="2" name="Title 1"/>
-          <p:cNvSpPr>
-            <a:spLocks noGrp="1"/>
-          </p:cNvSpPr>
-          <p:nvPr>
-            <p:ph type="ctrTitle"/>
-          </p:nvPr>
+          <p:cNvPr id="162" name="Google Shape;162;p3"/>
+          <p:cNvSpPr/>
+          <p:nvPr/>
         </p:nvSpPr>
         <p:spPr>
           <a:xfrm>
-            <a:off x="2135560" y="1700808"/>
-            <a:ext cx="7388072" cy="1085850"/>
+            <a:off x="753215" y="731221"/>
+            <a:ext cx="1852408" cy="1804715"/>
           </a:xfrm>
+          <a:prstGeom prst="rect">
+            <a:avLst/>
+          </a:prstGeom>
+          <a:noFill/>
+          <a:ln w="114300" cap="flat" cmpd="sng">
+            <a:solidFill>
+              <a:srgbClr val="0071F6"/>
+            </a:solidFill>
+            <a:prstDash val="solid"/>
+            <a:miter lim="800000"/>
+            <a:headEnd type="none" w="sm" len="sm"/>
+            <a:tailEnd type="none" w="sm" len="sm"/>
+          </a:ln>
         </p:spPr>
         <p:txBody>
-          <a:bodyPr>
-            <a:normAutofit/>
+          <a:bodyPr spcFirstLastPara="1" wrap="square" lIns="91425" tIns="45700" rIns="91425" bIns="45700" anchor="ctr" anchorCtr="0">
+            <a:noAutofit/>
           </a:bodyPr>
           <a:lstStyle/>
           <a:p>
-            <a:r>
-              <a:rPr lang="en-US" dirty="0"/>
-              <a:t>Module 02 – Working with environment</a:t>
-            </a:r>
-            <a:endParaRPr lang="he-IL" dirty="0"/>
+            <a:pPr marL="0" marR="0" lvl="0" indent="0" algn="ctr" rtl="0">
+              <a:spcBef>
+                <a:spcPts val="0"/>
+              </a:spcBef>
+              <a:spcAft>
+                <a:spcPts val="0"/>
+              </a:spcAft>
+              <a:buNone/>
+            </a:pPr>
+            <a:endParaRPr sz="10000" b="0" i="0" u="none" strike="noStrike" cap="none">
+              <a:solidFill>
+                <a:schemeClr val="lt1"/>
+              </a:solidFill>
+              <a:latin typeface="Calibri"/>
+              <a:ea typeface="Calibri"/>
+              <a:cs typeface="Calibri"/>
+              <a:sym typeface="Calibri"/>
+            </a:endParaRPr>
           </a:p>
         </p:txBody>
       </p:sp>
+      <p:sp>
+        <p:nvSpPr>
+          <p:cNvPr id="163" name="Google Shape;163;p3"/>
+          <p:cNvSpPr/>
+          <p:nvPr/>
+        </p:nvSpPr>
+        <p:spPr>
+          <a:xfrm>
+            <a:off x="1024128" y="974550"/>
+            <a:ext cx="1938528" cy="1220010"/>
+          </a:xfrm>
+          <a:prstGeom prst="rect">
+            <a:avLst/>
+          </a:prstGeom>
+          <a:solidFill>
+            <a:schemeClr val="lt1"/>
+          </a:solidFill>
+          <a:ln>
+            <a:noFill/>
+          </a:ln>
+        </p:spPr>
+        <p:txBody>
+          <a:bodyPr spcFirstLastPara="1" wrap="square" lIns="91425" tIns="45700" rIns="91425" bIns="45700" anchor="ctr" anchorCtr="0">
+            <a:noAutofit/>
+          </a:bodyPr>
+          <a:lstStyle/>
+          <a:p>
+            <a:pPr marL="0" marR="0" lvl="0" indent="0" algn="ctr" rtl="0">
+              <a:spcBef>
+                <a:spcPts val="0"/>
+              </a:spcBef>
+              <a:spcAft>
+                <a:spcPts val="0"/>
+              </a:spcAft>
+              <a:buNone/>
+            </a:pPr>
+            <a:endParaRPr sz="1800" b="0" i="0" u="none" strike="noStrike" cap="none">
+              <a:solidFill>
+                <a:schemeClr val="lt1"/>
+              </a:solidFill>
+              <a:latin typeface="Calibri"/>
+              <a:ea typeface="Calibri"/>
+              <a:cs typeface="Calibri"/>
+              <a:sym typeface="Calibri"/>
+            </a:endParaRPr>
+          </a:p>
+        </p:txBody>
+      </p:sp>
+      <p:sp>
+        <p:nvSpPr>
+          <p:cNvPr id="164" name="Google Shape;164;p3"/>
+          <p:cNvSpPr txBox="1"/>
+          <p:nvPr/>
+        </p:nvSpPr>
+        <p:spPr>
+          <a:xfrm>
+            <a:off x="1197504" y="1264978"/>
+            <a:ext cx="10241281" cy="696987"/>
+          </a:xfrm>
+          <a:prstGeom prst="rect">
+            <a:avLst/>
+          </a:prstGeom>
+          <a:noFill/>
+          <a:ln>
+            <a:noFill/>
+          </a:ln>
+        </p:spPr>
+        <p:txBody>
+          <a:bodyPr spcFirstLastPara="1" wrap="square" lIns="0" tIns="0" rIns="0" bIns="0" anchor="t" anchorCtr="0">
+            <a:noAutofit/>
+          </a:bodyPr>
+          <a:lstStyle/>
+          <a:p>
+            <a:pPr marL="0" marR="0" lvl="0" indent="0" algn="l" rtl="0">
+              <a:lnSpc>
+                <a:spcPct val="90000"/>
+              </a:lnSpc>
+              <a:spcBef>
+                <a:spcPts val="0"/>
+              </a:spcBef>
+              <a:spcAft>
+                <a:spcPts val="0"/>
+              </a:spcAft>
+              <a:buClr>
+                <a:schemeClr val="dk1"/>
+              </a:buClr>
+              <a:buSzPts val="5000"/>
+              <a:buFont typeface="Lexend"/>
+              <a:buNone/>
+            </a:pPr>
+            <a:r>
+              <a:rPr lang="en-US" sz="4800" b="1" dirty="0">
+                <a:latin typeface="Lexend" panose="020B0604020202020204"/>
+              </a:rPr>
+              <a:t>Module 02 – Working with environment</a:t>
+            </a:r>
+            <a:endParaRPr lang="en-US" b="1" i="0" u="none" strike="noStrike" cap="none" dirty="0">
+              <a:solidFill>
+                <a:schemeClr val="tx2">
+                  <a:lumMod val="25000"/>
+                </a:schemeClr>
+              </a:solidFill>
+              <a:latin typeface="Lexend" panose="020B0604020202020204"/>
+              <a:ea typeface="Lexend" panose="020B0604020202020204"/>
+              <a:cs typeface="Lexend" panose="020B0604020202020204"/>
+              <a:sym typeface="Lexend"/>
+            </a:endParaRPr>
+          </a:p>
+        </p:txBody>
+      </p:sp>
+      <p:grpSp>
+        <p:nvGrpSpPr>
+          <p:cNvPr id="26" name="Group 25">
+            <a:extLst>
+              <a:ext uri="{FF2B5EF4-FFF2-40B4-BE49-F238E27FC236}">
+                <a16:creationId xmlns:a16="http://schemas.microsoft.com/office/drawing/2014/main" id="{3707614E-B472-D72F-3362-F3D5800A79AE}"/>
+              </a:ext>
+            </a:extLst>
+          </p:cNvPr>
+          <p:cNvGrpSpPr/>
+          <p:nvPr/>
+        </p:nvGrpSpPr>
+        <p:grpSpPr>
+          <a:xfrm>
+            <a:off x="4768981" y="6314787"/>
+            <a:ext cx="2898939" cy="435065"/>
+            <a:chOff x="4346126" y="6301065"/>
+            <a:chExt cx="2898939" cy="435065"/>
+          </a:xfrm>
+        </p:grpSpPr>
+        <p:sp>
+          <p:nvSpPr>
+            <p:cNvPr id="27" name="Google Shape;157;p2">
+              <a:extLst>
+                <a:ext uri="{FF2B5EF4-FFF2-40B4-BE49-F238E27FC236}">
+                  <a16:creationId xmlns:a16="http://schemas.microsoft.com/office/drawing/2014/main" id="{4EA5EBB7-68D9-5C27-8971-C58931043AB0}"/>
+                </a:ext>
+              </a:extLst>
+            </p:cNvPr>
+            <p:cNvSpPr txBox="1"/>
+            <p:nvPr/>
+          </p:nvSpPr>
+          <p:spPr>
+            <a:xfrm>
+              <a:off x="4346126" y="6301065"/>
+              <a:ext cx="2898939" cy="260080"/>
+            </a:xfrm>
+            <a:prstGeom prst="rect">
+              <a:avLst/>
+            </a:prstGeom>
+            <a:noFill/>
+            <a:ln>
+              <a:noFill/>
+            </a:ln>
+          </p:spPr>
+          <p:txBody>
+            <a:bodyPr spcFirstLastPara="1" wrap="square" lIns="91425" tIns="45700" rIns="91425" bIns="45700" anchor="t" anchorCtr="0">
+              <a:noAutofit/>
+            </a:bodyPr>
+            <a:lstStyle/>
+            <a:p>
+              <a:pPr marL="0" marR="0" lvl="0" indent="0" algn="ctr" rtl="0">
+                <a:lnSpc>
+                  <a:spcPct val="90000"/>
+                </a:lnSpc>
+                <a:spcBef>
+                  <a:spcPts val="0"/>
+                </a:spcBef>
+                <a:spcAft>
+                  <a:spcPts val="0"/>
+                </a:spcAft>
+                <a:buClr>
+                  <a:schemeClr val="lt1"/>
+                </a:buClr>
+                <a:buSzPts val="4000"/>
+                <a:buFont typeface="Lexend"/>
+                <a:buNone/>
+              </a:pPr>
+              <a:r>
+                <a:rPr lang="en-US" sz="1100" b="1" i="0" u="none" strike="noStrike" cap="none" dirty="0">
+                  <a:solidFill>
+                    <a:srgbClr val="00DBE9"/>
+                  </a:solidFill>
+                  <a:latin typeface="+mn-lt"/>
+                  <a:ea typeface="Lexend"/>
+                  <a:cs typeface="+mn-cs"/>
+                  <a:sym typeface="Lexend"/>
+                  <a:hlinkClick r:id="rId3">
+                    <a:extLst>
+                      <a:ext uri="{A12FA001-AC4F-418D-AE19-62706E023703}">
+                        <ahyp:hlinkClr xmlns:ahyp="http://schemas.microsoft.com/office/drawing/2018/hyperlinkcolor" val="tx"/>
+                      </a:ext>
+                    </a:extLst>
+                  </a:hlinkClick>
+                </a:rPr>
+                <a:t>WWW.SELACLOUD.COM</a:t>
+              </a:r>
+              <a:endParaRPr sz="1100" dirty="0">
+                <a:solidFill>
+                  <a:srgbClr val="00DBE9"/>
+                </a:solidFill>
+                <a:latin typeface="+mn-lt"/>
+                <a:cs typeface="+mn-cs"/>
+              </a:endParaRPr>
+            </a:p>
+            <a:p>
+              <a:pPr marL="0" marR="0" lvl="0" indent="0" algn="ctr" rtl="0">
+                <a:lnSpc>
+                  <a:spcPct val="90000"/>
+                </a:lnSpc>
+                <a:spcBef>
+                  <a:spcPts val="0"/>
+                </a:spcBef>
+                <a:spcAft>
+                  <a:spcPts val="0"/>
+                </a:spcAft>
+                <a:buClr>
+                  <a:schemeClr val="lt1"/>
+                </a:buClr>
+                <a:buSzPts val="4000"/>
+                <a:buFont typeface="Noto Sans Hebrew"/>
+                <a:buNone/>
+              </a:pPr>
+              <a:endParaRPr sz="1100" b="1" i="0" u="none" strike="noStrike" cap="none" dirty="0">
+                <a:solidFill>
+                  <a:srgbClr val="00DBE9"/>
+                </a:solidFill>
+                <a:latin typeface="Lexend Light" pitchFamily="2" charset="0"/>
+                <a:ea typeface="Lexend"/>
+                <a:cs typeface="Lexend"/>
+                <a:sym typeface="Lexend"/>
+              </a:endParaRPr>
+            </a:p>
+          </p:txBody>
+        </p:sp>
+        <p:grpSp>
+          <p:nvGrpSpPr>
+            <p:cNvPr id="28" name="Group 27">
+              <a:extLst>
+                <a:ext uri="{FF2B5EF4-FFF2-40B4-BE49-F238E27FC236}">
+                  <a16:creationId xmlns:a16="http://schemas.microsoft.com/office/drawing/2014/main" id="{60FDA890-33F8-40FC-59E2-9BD7B4CF4B60}"/>
+                </a:ext>
+              </a:extLst>
+            </p:cNvPr>
+            <p:cNvGrpSpPr/>
+            <p:nvPr/>
+          </p:nvGrpSpPr>
+          <p:grpSpPr>
+            <a:xfrm>
+              <a:off x="5196988" y="6503312"/>
+              <a:ext cx="1188416" cy="232818"/>
+              <a:chOff x="5196988" y="6503312"/>
+              <a:chExt cx="1188416" cy="232818"/>
+            </a:xfrm>
+          </p:grpSpPr>
+          <p:pic>
+            <p:nvPicPr>
+              <p:cNvPr id="29" name="Picture 28" descr="Icon&#10;&#10;Description automatically generated">
+                <a:hlinkClick r:id="rId4"/>
+                <a:extLst>
+                  <a:ext uri="{FF2B5EF4-FFF2-40B4-BE49-F238E27FC236}">
+                    <a16:creationId xmlns:a16="http://schemas.microsoft.com/office/drawing/2014/main" id="{64501E28-0CD7-BEAB-240F-3FE7691367B8}"/>
+                  </a:ext>
+                </a:extLst>
+              </p:cNvPr>
+              <p:cNvPicPr>
+                <a:picLocks noChangeAspect="1"/>
+              </p:cNvPicPr>
+              <p:nvPr/>
+            </p:nvPicPr>
+            <p:blipFill>
+              <a:blip r:embed="rId5"/>
+              <a:stretch>
+                <a:fillRect/>
+              </a:stretch>
+            </p:blipFill>
+            <p:spPr>
+              <a:xfrm>
+                <a:off x="5407162" y="6503312"/>
+                <a:ext cx="338919" cy="232817"/>
+              </a:xfrm>
+              <a:prstGeom prst="rect">
+                <a:avLst/>
+              </a:prstGeom>
+            </p:spPr>
+          </p:pic>
+          <p:pic>
+            <p:nvPicPr>
+              <p:cNvPr id="30" name="Picture 29" descr="Logo, icon&#10;&#10;Description automatically generated">
+                <a:hlinkClick r:id="rId6"/>
+                <a:extLst>
+                  <a:ext uri="{FF2B5EF4-FFF2-40B4-BE49-F238E27FC236}">
+                    <a16:creationId xmlns:a16="http://schemas.microsoft.com/office/drawing/2014/main" id="{4D899894-16A2-81DC-1AC3-0E3C481677CD}"/>
+                  </a:ext>
+                </a:extLst>
+              </p:cNvPr>
+              <p:cNvPicPr>
+                <a:picLocks noChangeAspect="1"/>
+              </p:cNvPicPr>
+              <p:nvPr/>
+            </p:nvPicPr>
+            <p:blipFill>
+              <a:blip r:embed="rId7"/>
+              <a:stretch>
+                <a:fillRect/>
+              </a:stretch>
+            </p:blipFill>
+            <p:spPr>
+              <a:xfrm>
+                <a:off x="5837917" y="6503313"/>
+                <a:ext cx="338919" cy="232817"/>
+              </a:xfrm>
+              <a:prstGeom prst="rect">
+                <a:avLst/>
+              </a:prstGeom>
+            </p:spPr>
+          </p:pic>
+          <p:pic>
+            <p:nvPicPr>
+              <p:cNvPr id="31" name="Picture 30" descr="Logo&#10;&#10;Description automatically generated">
+                <a:hlinkClick r:id="rId8"/>
+                <a:extLst>
+                  <a:ext uri="{FF2B5EF4-FFF2-40B4-BE49-F238E27FC236}">
+                    <a16:creationId xmlns:a16="http://schemas.microsoft.com/office/drawing/2014/main" id="{6DECAAD2-14ED-D62E-83E5-01D62FD73E58}"/>
+                  </a:ext>
+                </a:extLst>
+              </p:cNvPr>
+              <p:cNvPicPr>
+                <a:picLocks noChangeAspect="1"/>
+              </p:cNvPicPr>
+              <p:nvPr/>
+            </p:nvPicPr>
+            <p:blipFill>
+              <a:blip r:embed="rId9"/>
+              <a:stretch>
+                <a:fillRect/>
+              </a:stretch>
+            </p:blipFill>
+            <p:spPr>
+              <a:xfrm>
+                <a:off x="6046485" y="6503313"/>
+                <a:ext cx="338919" cy="232817"/>
+              </a:xfrm>
+              <a:prstGeom prst="rect">
+                <a:avLst/>
+              </a:prstGeom>
+            </p:spPr>
+          </p:pic>
+          <p:pic>
+            <p:nvPicPr>
+              <p:cNvPr id="32" name="Picture 31" descr="Icon&#10;&#10;Description automatically generated">
+                <a:hlinkClick r:id="rId10"/>
+                <a:extLst>
+                  <a:ext uri="{FF2B5EF4-FFF2-40B4-BE49-F238E27FC236}">
+                    <a16:creationId xmlns:a16="http://schemas.microsoft.com/office/drawing/2014/main" id="{DC102836-817A-8573-C7AB-C2724E6E5F1C}"/>
+                  </a:ext>
+                </a:extLst>
+              </p:cNvPr>
+              <p:cNvPicPr>
+                <a:picLocks noChangeAspect="1"/>
+              </p:cNvPicPr>
+              <p:nvPr/>
+            </p:nvPicPr>
+            <p:blipFill>
+              <a:blip r:embed="rId11"/>
+              <a:stretch>
+                <a:fillRect/>
+              </a:stretch>
+            </p:blipFill>
+            <p:spPr>
+              <a:xfrm>
+                <a:off x="5196988" y="6503312"/>
+                <a:ext cx="338919" cy="232817"/>
+              </a:xfrm>
+              <a:prstGeom prst="rect">
+                <a:avLst/>
+              </a:prstGeom>
+            </p:spPr>
+          </p:pic>
+          <p:pic>
+            <p:nvPicPr>
+              <p:cNvPr id="33" name="Picture 32" descr="Icon&#10;&#10;Description automatically generated">
+                <a:hlinkClick r:id="rId12"/>
+                <a:extLst>
+                  <a:ext uri="{FF2B5EF4-FFF2-40B4-BE49-F238E27FC236}">
+                    <a16:creationId xmlns:a16="http://schemas.microsoft.com/office/drawing/2014/main" id="{F46B6109-4740-9E76-5C84-B96F79785CAF}"/>
+                  </a:ext>
+                </a:extLst>
+              </p:cNvPr>
+              <p:cNvPicPr>
+                <a:picLocks noChangeAspect="1"/>
+              </p:cNvPicPr>
+              <p:nvPr/>
+            </p:nvPicPr>
+            <p:blipFill>
+              <a:blip r:embed="rId13"/>
+              <a:stretch>
+                <a:fillRect/>
+              </a:stretch>
+            </p:blipFill>
+            <p:spPr>
+              <a:xfrm>
+                <a:off x="5626137" y="6503312"/>
+                <a:ext cx="338919" cy="232817"/>
+              </a:xfrm>
+              <a:prstGeom prst="rect">
+                <a:avLst/>
+              </a:prstGeom>
+            </p:spPr>
+          </p:pic>
+        </p:grpSp>
+      </p:grpSp>
     </p:spTree>
-    <p:extLst>
-      <p:ext uri="{BB962C8B-B14F-4D97-AF65-F5344CB8AC3E}">
-        <p14:creationId xmlns:p14="http://schemas.microsoft.com/office/powerpoint/2010/main" val="2844620833"/>
-      </p:ext>
-    </p:extLst>
   </p:cSld>
   <p:clrMapOvr>
     <a:masterClrMapping/>
   </p:clrMapOvr>
+  <mc:AlternateContent xmlns:mc="http://schemas.openxmlformats.org/markup-compatibility/2006" xmlns:p14="http://schemas.microsoft.com/office/powerpoint/2010/main">
+    <mc:Choice Requires="p14">
+      <p:transition spd="slow" p14:dur="2000" advTm="2283"/>
+    </mc:Choice>
+    <mc:Fallback xmlns="">
+      <p:transition spd="slow" advTm="2283"/>
+    </mc:Fallback>
+  </mc:AlternateContent>
 </p:sld>
 </file>
 
 <file path=ppt/slides/slide10.xml><?xml version="1.0" encoding="utf-8"?>
 <p:sld xmlns:a="http://schemas.openxmlformats.org/drawingml/2006/main" xmlns:r="http://schemas.openxmlformats.org/officeDocument/2006/relationships" xmlns:p="http://schemas.openxmlformats.org/presentationml/2006/main">
   <p:cSld>
+    <p:bg>
+      <p:bgPr>
+        <a:blipFill dpi="0" rotWithShape="1">
+          <a:blip r:embed="rId3">
+            <a:lum/>
+          </a:blip>
+          <a:srcRect/>
+          <a:stretch>
+            <a:fillRect/>
+          </a:stretch>
+        </a:blipFill>
+        <a:effectLst/>
+      </p:bgPr>
+    </p:bg>
     <p:spTree>
       <p:nvGrpSpPr>
         <p:cNvPr id="1" name=""/>
@@ -8207,22 +8527,15 @@
           <a:lstStyle/>
           <a:p>
             <a:r>
-              <a:rPr lang="en-US" b="0" i="0" dirty="0">
-                <a:solidFill>
-                  <a:srgbClr val="000000"/>
-                </a:solidFill>
-                <a:effectLst/>
-                <a:latin typeface="+mn-lt"/>
+              <a:rPr lang="en-US" b="1" i="0" dirty="0">
+                <a:solidFill>
+                  <a:srgbClr val="0071F6"/>
+                </a:solidFill>
+                <a:effectLst/>
+                <a:latin typeface="Lexend" panose="020B0604020202020204"/>
               </a:rPr>
               <a:t>Redirections</a:t>
             </a:r>
-            <a:endParaRPr lang="en-US" i="0" dirty="0">
-              <a:solidFill>
-                <a:srgbClr val="242424"/>
-              </a:solidFill>
-              <a:effectLst/>
-              <a:latin typeface="+mn-lt"/>
-            </a:endParaRPr>
           </a:p>
         </p:txBody>
       </p:sp>
@@ -8249,6 +8562,7 @@
                   <a:srgbClr val="000000"/>
                 </a:solidFill>
                 <a:effectLst/>
+                <a:latin typeface="Lexend Light"/>
               </a:rPr>
               <a:t>The standard output, error and input can be redirected e.g. into a file, so that we can process this file later with another program.</a:t>
             </a:r>
@@ -8259,6 +8573,7 @@
                 <a:srgbClr val="000000"/>
               </a:solidFill>
               <a:effectLst/>
+              <a:latin typeface="Lexend Light"/>
             </a:endParaRPr>
           </a:p>
           <a:p>
@@ -8268,6 +8583,7 @@
                   <a:srgbClr val="000000"/>
                 </a:solidFill>
                 <a:effectLst/>
+                <a:latin typeface="Lexend Light"/>
               </a:rPr>
               <a:t>We can redirect both stderr and </a:t>
             </a:r>
@@ -8277,6 +8593,7 @@
                   <a:srgbClr val="000000"/>
                 </a:solidFill>
                 <a:effectLst/>
+                <a:latin typeface="Lexend Light"/>
               </a:rPr>
               <a:t>stdout</a:t>
             </a:r>
@@ -8286,6 +8603,7 @@
                   <a:srgbClr val="000000"/>
                 </a:solidFill>
                 <a:effectLst/>
+                <a:latin typeface="Lexend Light"/>
               </a:rPr>
               <a:t> into the same file or into separate files</a:t>
             </a:r>
@@ -8308,6 +8626,20 @@
 <file path=ppt/slides/slide11.xml><?xml version="1.0" encoding="utf-8"?>
 <p:sld xmlns:a="http://schemas.openxmlformats.org/drawingml/2006/main" xmlns:r="http://schemas.openxmlformats.org/officeDocument/2006/relationships" xmlns:p="http://schemas.openxmlformats.org/presentationml/2006/main">
   <p:cSld>
+    <p:bg>
+      <p:bgPr>
+        <a:blipFill dpi="0" rotWithShape="1">
+          <a:blip r:embed="rId2">
+            <a:lum/>
+          </a:blip>
+          <a:srcRect/>
+          <a:stretch>
+            <a:fillRect/>
+          </a:stretch>
+        </a:blipFill>
+        <a:effectLst/>
+      </p:bgPr>
+    </p:bg>
     <p:spTree>
       <p:nvGrpSpPr>
         <p:cNvPr id="1" name=""/>
@@ -8338,10 +8670,14 @@
           <a:lstStyle/>
           <a:p>
             <a:r>
-              <a:rPr lang="en-US"/>
+              <a:rPr lang="en-US" b="1" dirty="0">
+                <a:latin typeface="Lexend Light"/>
+              </a:rPr>
               <a:t>Console Methods</a:t>
             </a:r>
-            <a:endParaRPr lang="he-IL"/>
+            <a:endParaRPr lang="he-IL" b="1" dirty="0">
+              <a:latin typeface="Lexend Light"/>
+            </a:endParaRPr>
           </a:p>
         </p:txBody>
       </p:sp>
@@ -8361,6 +8697,20 @@
 <file path=ppt/slides/slide12.xml><?xml version="1.0" encoding="utf-8"?>
 <p:sld xmlns:a="http://schemas.openxmlformats.org/drawingml/2006/main" xmlns:r="http://schemas.openxmlformats.org/officeDocument/2006/relationships" xmlns:p="http://schemas.openxmlformats.org/presentationml/2006/main">
   <p:cSld>
+    <p:bg>
+      <p:bgPr>
+        <a:blipFill dpi="0" rotWithShape="1">
+          <a:blip r:embed="rId3">
+            <a:lum/>
+          </a:blip>
+          <a:srcRect/>
+          <a:stretch>
+            <a:fillRect/>
+          </a:stretch>
+        </a:blipFill>
+        <a:effectLst/>
+      </p:bgPr>
+    </p:bg>
     <p:spTree>
       <p:nvGrpSpPr>
         <p:cNvPr id="1" name=""/>
@@ -8393,17 +8743,20 @@
           <a:lstStyle/>
           <a:p>
             <a:r>
-              <a:rPr lang="en-US" b="0" i="0" dirty="0">
-                <a:solidFill>
-                  <a:srgbClr val="000000"/>
-                </a:solidFill>
-                <a:effectLst/>
-                <a:latin typeface="+mn-lt"/>
+              <a:rPr lang="en-US" b="1" i="0" dirty="0">
+                <a:solidFill>
+                  <a:srgbClr val="0071F6"/>
+                </a:solidFill>
+                <a:effectLst/>
+                <a:latin typeface="Lexend" panose="020B0604020202020204"/>
               </a:rPr>
               <a:t>Redirections — cont’d</a:t>
             </a:r>
-            <a:endParaRPr lang="en-US" dirty="0">
-              <a:latin typeface="+mn-lt"/>
+            <a:endParaRPr lang="en-US" b="1" dirty="0">
+              <a:solidFill>
+                <a:srgbClr val="0071F6"/>
+              </a:solidFill>
+              <a:latin typeface="Lexend" panose="020B0604020202020204"/>
               <a:cs typeface="Calibri" panose="020F0502020204030204" pitchFamily="34" charset="0"/>
             </a:endParaRPr>
           </a:p>
@@ -9514,6 +9867,20 @@
 <file path=ppt/slides/slide13.xml><?xml version="1.0" encoding="utf-8"?>
 <p:sld xmlns:a="http://schemas.openxmlformats.org/drawingml/2006/main" xmlns:r="http://schemas.openxmlformats.org/officeDocument/2006/relationships" xmlns:p="http://schemas.openxmlformats.org/presentationml/2006/main">
   <p:cSld>
+    <p:bg>
+      <p:bgPr>
+        <a:blipFill dpi="0" rotWithShape="1">
+          <a:blip r:embed="rId3">
+            <a:lum/>
+          </a:blip>
+          <a:srcRect/>
+          <a:stretch>
+            <a:fillRect/>
+          </a:stretch>
+        </a:blipFill>
+        <a:effectLst/>
+      </p:bgPr>
+    </p:bg>
     <p:spTree>
       <p:nvGrpSpPr>
         <p:cNvPr id="1" name=""/>
@@ -9546,27 +9913,30 @@
           <a:lstStyle/>
           <a:p>
             <a:r>
-              <a:rPr lang="en-US" b="0" i="0" dirty="0" err="1">
-                <a:solidFill>
-                  <a:srgbClr val="000000"/>
-                </a:solidFill>
-                <a:effectLst/>
-                <a:latin typeface="+mn-lt"/>
+              <a:rPr lang="en-US" sz="4800" b="1" i="0" dirty="0" err="1">
+                <a:solidFill>
+                  <a:srgbClr val="0071F6"/>
+                </a:solidFill>
+                <a:effectLst/>
+                <a:latin typeface="Lexend" panose="020B0604020202020204"/>
               </a:rPr>
               <a:t>os</a:t>
             </a:r>
             <a:r>
-              <a:rPr lang="en-US" b="0" i="0" dirty="0">
-                <a:solidFill>
-                  <a:srgbClr val="000000"/>
-                </a:solidFill>
-                <a:effectLst/>
-                <a:latin typeface="+mn-lt"/>
+              <a:rPr lang="en-US" sz="4800" b="1" i="0" dirty="0">
+                <a:solidFill>
+                  <a:srgbClr val="0071F6"/>
+                </a:solidFill>
+                <a:effectLst/>
+                <a:latin typeface="Lexend" panose="020B0604020202020204"/>
               </a:rPr>
               <a:t> module</a:t>
             </a:r>
-            <a:endParaRPr lang="en-US" dirty="0">
-              <a:latin typeface="+mn-lt"/>
+            <a:endParaRPr lang="en-US" sz="4800" b="1" dirty="0">
+              <a:solidFill>
+                <a:srgbClr val="0071F6"/>
+              </a:solidFill>
+              <a:latin typeface="Lexend" panose="020B0604020202020204"/>
               <a:cs typeface="Calibri" panose="020F0502020204030204" pitchFamily="34" charset="0"/>
             </a:endParaRPr>
           </a:p>
@@ -9610,6 +9980,7 @@
                   <a:srgbClr val="000000"/>
                 </a:solidFill>
                 <a:effectLst/>
+                <a:latin typeface="Lexend Light"/>
               </a:rPr>
               <a:t>The OS module provides a portable way of using operating system dependent functionality. </a:t>
             </a:r>
@@ -9624,6 +9995,7 @@
                 <a:srgbClr val="000000"/>
               </a:solidFill>
               <a:effectLst/>
+              <a:latin typeface="Lexend Light"/>
             </a:endParaRPr>
           </a:p>
           <a:p>
@@ -9637,10 +10009,12 @@
                   <a:srgbClr val="000000"/>
                 </a:solidFill>
                 <a:effectLst/>
+                <a:latin typeface="Lexend Light"/>
               </a:rPr>
               <a:t>The functions that the OS module provides allows you to interface with the underlying operating system that Python is running on — be that Windows, Mac or Linux.</a:t>
             </a:r>
             <a:endParaRPr lang="en-GB" sz="3600" dirty="0">
+              <a:latin typeface="Lexend Light"/>
               <a:cs typeface="Calibri" panose="020F0502020204030204" pitchFamily="34" charset="0"/>
             </a:endParaRPr>
           </a:p>
@@ -9662,6 +10036,20 @@
 <file path=ppt/slides/slide14.xml><?xml version="1.0" encoding="utf-8"?>
 <p:sld xmlns:a="http://schemas.openxmlformats.org/drawingml/2006/main" xmlns:r="http://schemas.openxmlformats.org/officeDocument/2006/relationships" xmlns:p="http://schemas.openxmlformats.org/presentationml/2006/main">
   <p:cSld>
+    <p:bg>
+      <p:bgPr>
+        <a:blipFill dpi="0" rotWithShape="1">
+          <a:blip r:embed="rId2">
+            <a:lum/>
+          </a:blip>
+          <a:srcRect/>
+          <a:stretch>
+            <a:fillRect/>
+          </a:stretch>
+        </a:blipFill>
+        <a:effectLst/>
+      </p:bgPr>
+    </p:bg>
     <p:spTree>
       <p:nvGrpSpPr>
         <p:cNvPr id="1" name=""/>
@@ -9692,10 +10080,14 @@
           <a:lstStyle/>
           <a:p>
             <a:r>
-              <a:rPr lang="en-US"/>
+              <a:rPr lang="en-US" b="1" dirty="0">
+                <a:latin typeface="Lexend Light"/>
+              </a:rPr>
               <a:t>Lab 01</a:t>
             </a:r>
-            <a:endParaRPr lang="he-IL"/>
+            <a:endParaRPr lang="he-IL" b="1" dirty="0">
+              <a:latin typeface="Lexend Light"/>
+            </a:endParaRPr>
           </a:p>
         </p:txBody>
       </p:sp>
@@ -9715,6 +10107,20 @@
 <file path=ppt/slides/slide15.xml><?xml version="1.0" encoding="utf-8"?>
 <p:sld xmlns:a="http://schemas.openxmlformats.org/drawingml/2006/main" xmlns:r="http://schemas.openxmlformats.org/officeDocument/2006/relationships" xmlns:p="http://schemas.openxmlformats.org/presentationml/2006/main">
   <p:cSld>
+    <p:bg>
+      <p:bgPr>
+        <a:blipFill dpi="0" rotWithShape="1">
+          <a:blip r:embed="rId3">
+            <a:lum/>
+          </a:blip>
+          <a:srcRect/>
+          <a:stretch>
+            <a:fillRect/>
+          </a:stretch>
+        </a:blipFill>
+        <a:effectLst/>
+      </p:bgPr>
+    </p:bg>
     <p:spTree>
       <p:nvGrpSpPr>
         <p:cNvPr id="1" name=""/>
@@ -9747,17 +10153,20 @@
           <a:lstStyle/>
           <a:p>
             <a:r>
-              <a:rPr lang="en-US" b="0" i="0" dirty="0">
-                <a:solidFill>
-                  <a:srgbClr val="000000"/>
-                </a:solidFill>
-                <a:effectLst/>
-                <a:latin typeface="+mn-lt"/>
+              <a:rPr lang="en-US" b="1" i="0" dirty="0">
+                <a:solidFill>
+                  <a:srgbClr val="0071F6"/>
+                </a:solidFill>
+                <a:effectLst/>
+                <a:latin typeface="Lexend" panose="020B0604020202020204"/>
               </a:rPr>
               <a:t>Environment variables</a:t>
             </a:r>
-            <a:endParaRPr lang="en-US" dirty="0">
-              <a:latin typeface="+mn-lt"/>
+            <a:endParaRPr lang="en-US" b="1" dirty="0">
+              <a:solidFill>
+                <a:srgbClr val="0071F6"/>
+              </a:solidFill>
+              <a:latin typeface="Lexend" panose="020B0604020202020204"/>
               <a:cs typeface="Calibri" panose="020F0502020204030204" pitchFamily="34" charset="0"/>
             </a:endParaRPr>
           </a:p>
@@ -9778,7 +10187,7 @@
         <p:spPr>
           <a:xfrm>
             <a:off x="838200" y="1766886"/>
-            <a:ext cx="10591800" cy="3416320"/>
+            <a:ext cx="10591800" cy="3785652"/>
           </a:xfrm>
           <a:prstGeom prst="rect">
             <a:avLst/>
@@ -9796,29 +10205,32 @@
               <a:buChar char="•"/>
             </a:pPr>
             <a:r>
-              <a:rPr lang="en-US" b="1" i="0" dirty="0" err="1">
-                <a:solidFill>
-                  <a:srgbClr val="000000"/>
-                </a:solidFill>
-                <a:effectLst/>
+              <a:rPr lang="en-US" sz="2000" b="1" i="0" dirty="0" err="1">
+                <a:solidFill>
+                  <a:srgbClr val="000000"/>
+                </a:solidFill>
+                <a:effectLst/>
+                <a:latin typeface="Lexend Light"/>
               </a:rPr>
               <a:t>os.environ</a:t>
             </a:r>
             <a:r>
-              <a:rPr lang="en-US" b="1" i="0" dirty="0">
-                <a:solidFill>
-                  <a:srgbClr val="000000"/>
-                </a:solidFill>
-                <a:effectLst/>
+              <a:rPr lang="en-US" sz="2000" b="1" i="0" dirty="0">
+                <a:solidFill>
+                  <a:srgbClr val="000000"/>
+                </a:solidFill>
+                <a:effectLst/>
+                <a:latin typeface="Lexend Light"/>
               </a:rPr>
               <a:t> </a:t>
             </a:r>
             <a:r>
-              <a:rPr lang="en-US" b="0" i="0" dirty="0">
-                <a:solidFill>
-                  <a:srgbClr val="000000"/>
-                </a:solidFill>
-                <a:effectLst/>
+              <a:rPr lang="en-US" sz="2000" b="0" i="0" dirty="0">
+                <a:solidFill>
+                  <a:srgbClr val="000000"/>
+                </a:solidFill>
+                <a:effectLst/>
+                <a:latin typeface="Lexend Light"/>
               </a:rPr>
               <a:t>- A mapping object representing the string environment.</a:t>
             </a:r>
@@ -9828,11 +10240,12 @@
               <a:buFont typeface="Arial" panose="020B0604020202020204" pitchFamily="34" charset="0"/>
               <a:buChar char="•"/>
             </a:pPr>
-            <a:endParaRPr lang="en-US" b="0" i="0" dirty="0">
+            <a:endParaRPr lang="en-US" sz="2000" b="0" i="0" dirty="0">
               <a:solidFill>
                 <a:srgbClr val="000000"/>
               </a:solidFill>
               <a:effectLst/>
+              <a:latin typeface="Lexend Light"/>
             </a:endParaRPr>
           </a:p>
           <a:p>
@@ -9841,134 +10254,148 @@
               <a:buChar char="•"/>
             </a:pPr>
             <a:r>
-              <a:rPr lang="en-US" b="1" i="0" dirty="0" err="1">
-                <a:solidFill>
-                  <a:srgbClr val="000000"/>
-                </a:solidFill>
-                <a:effectLst/>
+              <a:rPr lang="en-US" sz="2000" b="1" i="0" dirty="0" err="1">
+                <a:solidFill>
+                  <a:srgbClr val="000000"/>
+                </a:solidFill>
+                <a:effectLst/>
+                <a:latin typeface="Lexend Light"/>
               </a:rPr>
               <a:t>os.getenv</a:t>
             </a:r>
             <a:r>
-              <a:rPr lang="en-US" b="1" i="0" dirty="0">
-                <a:solidFill>
-                  <a:srgbClr val="000000"/>
-                </a:solidFill>
-                <a:effectLst/>
+              <a:rPr lang="en-US" sz="2000" b="1" i="0" dirty="0">
+                <a:solidFill>
+                  <a:srgbClr val="000000"/>
+                </a:solidFill>
+                <a:effectLst/>
+                <a:latin typeface="Lexend Light"/>
               </a:rPr>
               <a:t>(</a:t>
             </a:r>
             <a:r>
-              <a:rPr lang="en-US" b="1" i="0" dirty="0" err="1">
-                <a:solidFill>
-                  <a:srgbClr val="000000"/>
-                </a:solidFill>
-                <a:effectLst/>
+              <a:rPr lang="en-US" sz="2000" b="1" i="0" dirty="0" err="1">
+                <a:solidFill>
+                  <a:srgbClr val="000000"/>
+                </a:solidFill>
+                <a:effectLst/>
+                <a:latin typeface="Lexend Light"/>
               </a:rPr>
               <a:t>varname</a:t>
             </a:r>
             <a:r>
-              <a:rPr lang="en-US" b="1" i="0" dirty="0">
-                <a:solidFill>
-                  <a:srgbClr val="000000"/>
-                </a:solidFill>
-                <a:effectLst/>
+              <a:rPr lang="en-US" sz="2000" b="1" i="0" dirty="0">
+                <a:solidFill>
+                  <a:srgbClr val="000000"/>
+                </a:solidFill>
+                <a:effectLst/>
+                <a:latin typeface="Lexend Light"/>
               </a:rPr>
               <a:t>, value=None) </a:t>
             </a:r>
             <a:r>
-              <a:rPr lang="en-US" b="0" i="0" dirty="0">
-                <a:solidFill>
-                  <a:srgbClr val="000000"/>
-                </a:solidFill>
-                <a:effectLst/>
+              <a:rPr lang="en-US" sz="2000" b="0" i="0" dirty="0">
+                <a:solidFill>
+                  <a:srgbClr val="000000"/>
+                </a:solidFill>
+                <a:effectLst/>
+                <a:latin typeface="Lexend Light"/>
               </a:rPr>
               <a:t>- Return the value of the environment variable </a:t>
             </a:r>
             <a:r>
-              <a:rPr lang="en-US" b="0" i="0" dirty="0" err="1">
-                <a:solidFill>
-                  <a:srgbClr val="000000"/>
-                </a:solidFill>
-                <a:effectLst/>
+              <a:rPr lang="en-US" sz="2000" b="0" i="0" dirty="0" err="1">
+                <a:solidFill>
+                  <a:srgbClr val="000000"/>
+                </a:solidFill>
+                <a:effectLst/>
+                <a:latin typeface="Lexend Light"/>
               </a:rPr>
               <a:t>varname</a:t>
             </a:r>
             <a:r>
-              <a:rPr lang="en-US" b="0" i="0" dirty="0">
-                <a:solidFill>
-                  <a:srgbClr val="000000"/>
-                </a:solidFill>
-                <a:effectLst/>
+              <a:rPr lang="en-US" sz="2000" b="0" i="0" dirty="0">
+                <a:solidFill>
+                  <a:srgbClr val="000000"/>
+                </a:solidFill>
+                <a:effectLst/>
+                <a:latin typeface="Lexend Light"/>
               </a:rPr>
               <a:t> if it exists, or value otherwise. </a:t>
             </a:r>
           </a:p>
           <a:p>
             <a:r>
-              <a:rPr lang="en-US" b="0" i="0" dirty="0">
-                <a:solidFill>
-                  <a:srgbClr val="000000"/>
-                </a:solidFill>
-                <a:effectLst/>
+              <a:rPr lang="en-US" sz="2000" b="0" i="0" dirty="0">
+                <a:solidFill>
+                  <a:srgbClr val="000000"/>
+                </a:solidFill>
+                <a:effectLst/>
+                <a:latin typeface="Lexend Light"/>
               </a:rPr>
               <a:t>	For example:</a:t>
             </a:r>
           </a:p>
           <a:p>
             <a:r>
-              <a:rPr lang="en-US" b="0" i="0" dirty="0">
-                <a:solidFill>
-                  <a:srgbClr val="000000"/>
-                </a:solidFill>
-                <a:effectLst/>
+              <a:rPr lang="en-US" sz="2000" b="0" i="0" dirty="0">
+                <a:solidFill>
+                  <a:srgbClr val="000000"/>
+                </a:solidFill>
+                <a:effectLst/>
+                <a:latin typeface="Lexend Light"/>
               </a:rPr>
               <a:t>		</a:t>
             </a:r>
             <a:r>
-              <a:rPr lang="en-US" b="0" i="0" dirty="0" err="1">
-                <a:solidFill>
-                  <a:srgbClr val="000000"/>
-                </a:solidFill>
-                <a:effectLst/>
+              <a:rPr lang="en-US" sz="2000" b="0" i="0" dirty="0" err="1">
+                <a:solidFill>
+                  <a:srgbClr val="000000"/>
+                </a:solidFill>
+                <a:effectLst/>
+                <a:latin typeface="Lexend Light"/>
               </a:rPr>
               <a:t>os.environ</a:t>
             </a:r>
             <a:r>
-              <a:rPr lang="en-US" b="0" i="0" dirty="0">
-                <a:solidFill>
-                  <a:srgbClr val="000000"/>
-                </a:solidFill>
-                <a:effectLst/>
+              <a:rPr lang="en-US" sz="2000" b="0" i="0" dirty="0">
+                <a:solidFill>
+                  <a:srgbClr val="000000"/>
+                </a:solidFill>
+                <a:effectLst/>
+                <a:latin typeface="Lexend Light"/>
               </a:rPr>
               <a:t>['HOME’] </a:t>
             </a:r>
           </a:p>
           <a:p>
             <a:r>
-              <a:rPr lang="en-US" b="0" i="0" dirty="0">
-                <a:solidFill>
-                  <a:srgbClr val="000000"/>
-                </a:solidFill>
-                <a:effectLst/>
+              <a:rPr lang="en-US" sz="2000" b="0" i="0" dirty="0">
+                <a:solidFill>
+                  <a:srgbClr val="000000"/>
+                </a:solidFill>
+                <a:effectLst/>
+                <a:latin typeface="Lexend Light"/>
               </a:rPr>
               <a:t>		</a:t>
             </a:r>
             <a:r>
-              <a:rPr lang="en-US" b="0" i="0" dirty="0" err="1">
-                <a:solidFill>
-                  <a:srgbClr val="000000"/>
-                </a:solidFill>
-                <a:effectLst/>
+              <a:rPr lang="en-US" sz="2000" b="0" i="0" dirty="0" err="1">
+                <a:solidFill>
+                  <a:srgbClr val="000000"/>
+                </a:solidFill>
+                <a:effectLst/>
+                <a:latin typeface="Lexend Light"/>
               </a:rPr>
               <a:t>os.getenv</a:t>
             </a:r>
             <a:r>
-              <a:rPr lang="en-US" b="0" i="0" dirty="0">
-                <a:solidFill>
-                  <a:srgbClr val="000000"/>
-                </a:solidFill>
-                <a:effectLst/>
+              <a:rPr lang="en-US" sz="2000" b="0" i="0" dirty="0">
+                <a:solidFill>
+                  <a:srgbClr val="000000"/>
+                </a:solidFill>
+                <a:effectLst/>
+                <a:latin typeface="Lexend Light"/>
               </a:rPr>
               <a:t>("HOME") </a:t>
             </a:r>
@@ -9978,10 +10405,11 @@
               <a:buFont typeface="Arial" panose="020B0604020202020204" pitchFamily="34" charset="0"/>
               <a:buChar char="•"/>
             </a:pPr>
-            <a:endParaRPr lang="en-US" dirty="0">
+            <a:endParaRPr lang="en-US" sz="2000" dirty="0">
               <a:solidFill>
                 <a:srgbClr val="000000"/>
               </a:solidFill>
+              <a:latin typeface="Lexend Light"/>
             </a:endParaRPr>
           </a:p>
           <a:p>
@@ -9990,22 +10418,24 @@
               <a:buChar char="•"/>
             </a:pPr>
             <a:r>
-              <a:rPr lang="en-US" b="0" i="0" dirty="0">
-                <a:solidFill>
-                  <a:srgbClr val="000000"/>
-                </a:solidFill>
-                <a:effectLst/>
+              <a:rPr lang="en-US" sz="2000" b="0" i="0" dirty="0">
+                <a:solidFill>
+                  <a:srgbClr val="000000"/>
+                </a:solidFill>
+                <a:effectLst/>
+                <a:latin typeface="Lexend Light"/>
               </a:rPr>
               <a:t>Both returns a PATH environment variable value.</a:t>
             </a:r>
           </a:p>
           <a:p>
             <a:r>
-              <a:rPr lang="en-US" b="0" i="0" dirty="0">
-                <a:solidFill>
-                  <a:srgbClr val="000000"/>
-                </a:solidFill>
-                <a:effectLst/>
+              <a:rPr lang="en-US" sz="2000" b="0" i="0" dirty="0">
+                <a:solidFill>
+                  <a:srgbClr val="000000"/>
+                </a:solidFill>
+                <a:effectLst/>
+                <a:latin typeface="Lexend Light"/>
               </a:rPr>
               <a:t> </a:t>
             </a:r>
@@ -10016,15 +10446,17 @@
               <a:buChar char="•"/>
             </a:pPr>
             <a:r>
-              <a:rPr lang="en-US" b="0" i="0" dirty="0">
-                <a:solidFill>
-                  <a:srgbClr val="000000"/>
-                </a:solidFill>
-                <a:effectLst/>
+              <a:rPr lang="en-US" sz="2000" b="0" i="0" dirty="0">
+                <a:solidFill>
+                  <a:srgbClr val="000000"/>
+                </a:solidFill>
+                <a:effectLst/>
+                <a:latin typeface="Lexend Light"/>
               </a:rPr>
               <a:t>PATH value specifies the directories in which executable programs ‘are " located on the machine that can be started without knowing and typing the whole path to the file on the command line</a:t>
             </a:r>
-            <a:endParaRPr lang="en-GB" dirty="0">
+            <a:endParaRPr lang="en-GB" sz="2000" dirty="0">
+              <a:latin typeface="Lexend Light"/>
               <a:cs typeface="Calibri" panose="020F0502020204030204" pitchFamily="34" charset="0"/>
             </a:endParaRPr>
           </a:p>
@@ -10046,6 +10478,20 @@
 <file path=ppt/slides/slide16.xml><?xml version="1.0" encoding="utf-8"?>
 <p:sld xmlns:a="http://schemas.openxmlformats.org/drawingml/2006/main" xmlns:r="http://schemas.openxmlformats.org/officeDocument/2006/relationships" xmlns:p="http://schemas.openxmlformats.org/presentationml/2006/main">
   <p:cSld>
+    <p:bg>
+      <p:bgPr>
+        <a:blipFill dpi="0" rotWithShape="1">
+          <a:blip r:embed="rId3">
+            <a:lum/>
+          </a:blip>
+          <a:srcRect/>
+          <a:stretch>
+            <a:fillRect/>
+          </a:stretch>
+        </a:blipFill>
+        <a:effectLst/>
+      </p:bgPr>
+    </p:bg>
     <p:spTree>
       <p:nvGrpSpPr>
         <p:cNvPr id="1" name=""/>
@@ -10078,17 +10524,20 @@
           <a:lstStyle/>
           <a:p>
             <a:r>
-              <a:rPr lang="en-US" b="0" i="0" dirty="0">
-                <a:solidFill>
-                  <a:srgbClr val="000000"/>
-                </a:solidFill>
-                <a:effectLst/>
-                <a:latin typeface="+mn-lt"/>
+              <a:rPr lang="en-US" b="1" i="0" dirty="0">
+                <a:solidFill>
+                  <a:srgbClr val="0071F6"/>
+                </a:solidFill>
+                <a:effectLst/>
+                <a:latin typeface="Lexend" panose="020B0604020202020204"/>
               </a:rPr>
               <a:t>Environment variables — cont’d</a:t>
             </a:r>
-            <a:endParaRPr lang="en-US" dirty="0">
-              <a:latin typeface="+mn-lt"/>
+            <a:endParaRPr lang="en-US" b="1" dirty="0">
+              <a:solidFill>
+                <a:srgbClr val="0071F6"/>
+              </a:solidFill>
+              <a:latin typeface="Lexend" panose="020B0604020202020204"/>
               <a:cs typeface="Calibri" panose="020F0502020204030204" pitchFamily="34" charset="0"/>
             </a:endParaRPr>
           </a:p>
@@ -10132,6 +10581,7 @@
                   <a:srgbClr val="000000"/>
                 </a:solidFill>
                 <a:effectLst/>
+                <a:latin typeface="Lexend Light"/>
               </a:rPr>
               <a:t>os.putenv</a:t>
             </a:r>
@@ -10141,6 +10591,7 @@
                   <a:srgbClr val="000000"/>
                 </a:solidFill>
                 <a:effectLst/>
+                <a:latin typeface="Lexend Light"/>
               </a:rPr>
               <a:t>(</a:t>
             </a:r>
@@ -10150,6 +10601,7 @@
                   <a:srgbClr val="000000"/>
                 </a:solidFill>
                 <a:effectLst/>
+                <a:latin typeface="Lexend Light"/>
               </a:rPr>
               <a:t>varname</a:t>
             </a:r>
@@ -10159,6 +10611,7 @@
                   <a:srgbClr val="000000"/>
                 </a:solidFill>
                 <a:effectLst/>
+                <a:latin typeface="Lexend Light"/>
               </a:rPr>
               <a:t>, value)</a:t>
             </a:r>
@@ -10168,6 +10621,7 @@
                   <a:srgbClr val="000000"/>
                 </a:solidFill>
                 <a:effectLst/>
+                <a:latin typeface="Lexend Light"/>
               </a:rPr>
               <a:t> - Set the environment variable named </a:t>
             </a:r>
@@ -10177,6 +10631,7 @@
                   <a:srgbClr val="000000"/>
                 </a:solidFill>
                 <a:effectLst/>
+                <a:latin typeface="Lexend Light"/>
               </a:rPr>
               <a:t>varname</a:t>
             </a:r>
@@ -10186,6 +10641,7 @@
                   <a:srgbClr val="000000"/>
                 </a:solidFill>
                 <a:effectLst/>
+                <a:latin typeface="Lexend Light"/>
               </a:rPr>
               <a:t> with a value. </a:t>
             </a:r>
@@ -10196,6 +10652,7 @@
                 <a:solidFill>
                   <a:srgbClr val="000000"/>
                 </a:solidFill>
+                <a:latin typeface="Lexend Light"/>
               </a:rPr>
               <a:t>	</a:t>
             </a:r>
@@ -10205,10 +10662,12 @@
                   <a:srgbClr val="000000"/>
                 </a:solidFill>
                 <a:effectLst/>
+                <a:latin typeface="Lexend Light"/>
               </a:rPr>
               <a:t>— Such a changes to the environment affects the sub- 	processes, created after the change</a:t>
             </a:r>
             <a:endParaRPr lang="en-GB" sz="3200" dirty="0">
+              <a:latin typeface="Lexend Light"/>
               <a:cs typeface="Calibri" panose="020F0502020204030204" pitchFamily="34" charset="0"/>
             </a:endParaRPr>
           </a:p>
@@ -10230,6 +10689,20 @@
 <file path=ppt/slides/slide17.xml><?xml version="1.0" encoding="utf-8"?>
 <p:sld xmlns:a="http://schemas.openxmlformats.org/drawingml/2006/main" xmlns:r="http://schemas.openxmlformats.org/officeDocument/2006/relationships" xmlns:p="http://schemas.openxmlformats.org/presentationml/2006/main">
   <p:cSld>
+    <p:bg>
+      <p:bgPr>
+        <a:blipFill dpi="0" rotWithShape="1">
+          <a:blip r:embed="rId3">
+            <a:lum/>
+          </a:blip>
+          <a:srcRect/>
+          <a:stretch>
+            <a:fillRect/>
+          </a:stretch>
+        </a:blipFill>
+        <a:effectLst/>
+      </p:bgPr>
+    </p:bg>
     <p:spTree>
       <p:nvGrpSpPr>
         <p:cNvPr id="1" name=""/>
@@ -10267,27 +10740,30 @@
           <a:lstStyle/>
           <a:p>
             <a:r>
-              <a:rPr lang="en-US" b="0" i="0" dirty="0" err="1">
-                <a:solidFill>
-                  <a:srgbClr val="000000"/>
-                </a:solidFill>
-                <a:effectLst/>
-                <a:latin typeface="+mn-lt"/>
+              <a:rPr lang="en-US" b="1" i="0" dirty="0" err="1">
+                <a:solidFill>
+                  <a:srgbClr val="0071F6"/>
+                </a:solidFill>
+                <a:effectLst/>
+                <a:latin typeface="Lexend" panose="020B0604020202020204"/>
               </a:rPr>
               <a:t>os.path</a:t>
             </a:r>
             <a:r>
-              <a:rPr lang="en-US" b="0" i="0" dirty="0">
-                <a:solidFill>
-                  <a:srgbClr val="000000"/>
-                </a:solidFill>
-                <a:effectLst/>
-                <a:latin typeface="+mn-lt"/>
+              <a:rPr lang="en-US" b="1" i="0" dirty="0">
+                <a:solidFill>
+                  <a:srgbClr val="0071F6"/>
+                </a:solidFill>
+                <a:effectLst/>
+                <a:latin typeface="Lexend" panose="020B0604020202020204"/>
               </a:rPr>
               <a:t> — Common pathname manipulations</a:t>
             </a:r>
-            <a:endParaRPr lang="en-US" dirty="0">
-              <a:latin typeface="+mn-lt"/>
+            <a:endParaRPr lang="en-US" b="1" dirty="0">
+              <a:solidFill>
+                <a:srgbClr val="0071F6"/>
+              </a:solidFill>
+              <a:latin typeface="Lexend" panose="020B0604020202020204"/>
               <a:cs typeface="Calibri" panose="020F0502020204030204" pitchFamily="34" charset="0"/>
             </a:endParaRPr>
           </a:p>
@@ -10316,6 +10792,7 @@
                   <a:srgbClr val="000000"/>
                 </a:solidFill>
                 <a:effectLst/>
+                <a:latin typeface="Lexend Light"/>
               </a:rPr>
               <a:t>os.path.dirname</a:t>
             </a:r>
@@ -10325,6 +10802,7 @@
                   <a:srgbClr val="000000"/>
                 </a:solidFill>
                 <a:effectLst/>
+                <a:latin typeface="Lexend Light"/>
               </a:rPr>
               <a:t>(path) </a:t>
             </a:r>
@@ -10334,6 +10812,7 @@
                   <a:srgbClr val="000000"/>
                 </a:solidFill>
                 <a:effectLst/>
+                <a:latin typeface="Lexend Light"/>
               </a:rPr>
               <a:t>- return the directory name of pathname path </a:t>
             </a:r>
@@ -10345,6 +10824,7 @@
                   <a:srgbClr val="000000"/>
                 </a:solidFill>
                 <a:effectLst/>
+                <a:latin typeface="Lexend Light"/>
               </a:rPr>
               <a:t>os.path.exists</a:t>
             </a:r>
@@ -10354,6 +10834,7 @@
                   <a:srgbClr val="000000"/>
                 </a:solidFill>
                 <a:effectLst/>
+                <a:latin typeface="Lexend Light"/>
               </a:rPr>
               <a:t>(path)</a:t>
             </a:r>
@@ -10363,6 +10844,7 @@
                   <a:srgbClr val="000000"/>
                 </a:solidFill>
                 <a:effectLst/>
+                <a:latin typeface="Lexend Light"/>
               </a:rPr>
               <a:t> - return True if path refers to an existing path </a:t>
             </a:r>
@@ -10374,6 +10856,7 @@
                   <a:srgbClr val="000000"/>
                 </a:solidFill>
                 <a:effectLst/>
+                <a:latin typeface="Lexend Light"/>
               </a:rPr>
               <a:t>os.path.isfile</a:t>
             </a:r>
@@ -10383,6 +10866,7 @@
                   <a:srgbClr val="000000"/>
                 </a:solidFill>
                 <a:effectLst/>
+                <a:latin typeface="Lexend Light"/>
               </a:rPr>
               <a:t>(path)</a:t>
             </a:r>
@@ -10392,6 +10876,7 @@
                   <a:srgbClr val="000000"/>
                 </a:solidFill>
                 <a:effectLst/>
+                <a:latin typeface="Lexend Light"/>
               </a:rPr>
               <a:t> - return True if path is an existing regular file. </a:t>
             </a:r>
@@ -10403,6 +10888,7 @@
                   <a:srgbClr val="000000"/>
                 </a:solidFill>
                 <a:effectLst/>
+                <a:latin typeface="Lexend Light"/>
               </a:rPr>
               <a:t>os.path.isdir</a:t>
             </a:r>
@@ -10412,6 +10898,7 @@
                   <a:srgbClr val="000000"/>
                 </a:solidFill>
                 <a:effectLst/>
+                <a:latin typeface="Lexend Light"/>
               </a:rPr>
               <a:t>(path)</a:t>
             </a:r>
@@ -10421,6 +10908,7 @@
                   <a:srgbClr val="000000"/>
                 </a:solidFill>
                 <a:effectLst/>
+                <a:latin typeface="Lexend Light"/>
               </a:rPr>
               <a:t> - return True if path is an existing directory. </a:t>
             </a:r>
@@ -10432,6 +10920,7 @@
                   <a:srgbClr val="000000"/>
                 </a:solidFill>
                 <a:effectLst/>
+                <a:latin typeface="Lexend Light"/>
               </a:rPr>
               <a:t>os.path.islink</a:t>
             </a:r>
@@ -10441,6 +10930,7 @@
                   <a:srgbClr val="000000"/>
                 </a:solidFill>
                 <a:effectLst/>
+                <a:latin typeface="Lexend Light"/>
               </a:rPr>
               <a:t>(path)</a:t>
             </a:r>
@@ -10450,6 +10940,7 @@
                   <a:srgbClr val="000000"/>
                 </a:solidFill>
                 <a:effectLst/>
+                <a:latin typeface="Lexend Light"/>
               </a:rPr>
               <a:t> - return True if path refers to a directory entry that is a symbolic link</a:t>
             </a:r>
@@ -10461,6 +10952,7 @@
                   <a:srgbClr val="000000"/>
                 </a:solidFill>
                 <a:effectLst/>
+                <a:latin typeface="Lexend Light"/>
               </a:rPr>
               <a:t>os.path.join</a:t>
             </a:r>
@@ -10470,6 +10962,7 @@
                   <a:srgbClr val="000000"/>
                 </a:solidFill>
                 <a:effectLst/>
+                <a:latin typeface="Lexend Light"/>
               </a:rPr>
               <a:t>(path, *paths) </a:t>
             </a:r>
@@ -10479,6 +10972,7 @@
                   <a:srgbClr val="000000"/>
                 </a:solidFill>
                 <a:effectLst/>
+                <a:latin typeface="Lexend Light"/>
               </a:rPr>
               <a:t>- join one or more path components intelligently </a:t>
             </a:r>
@@ -10490,10 +10984,12 @@
                   <a:srgbClr val="000000"/>
                 </a:solidFill>
                 <a:effectLst/>
+                <a:latin typeface="Lexend Light"/>
               </a:rPr>
               <a:t>etc</a:t>
             </a:r>
             <a:endParaRPr lang="en-US" b="1" dirty="0">
+              <a:latin typeface="Lexend Light"/>
               <a:cs typeface="Calibri" panose="020F0502020204030204" pitchFamily="34" charset="0"/>
             </a:endParaRPr>
           </a:p>
@@ -10515,6 +11011,20 @@
 <file path=ppt/slides/slide18.xml><?xml version="1.0" encoding="utf-8"?>
 <p:sld xmlns:a="http://schemas.openxmlformats.org/drawingml/2006/main" xmlns:r="http://schemas.openxmlformats.org/officeDocument/2006/relationships" xmlns:p="http://schemas.openxmlformats.org/presentationml/2006/main">
   <p:cSld>
+    <p:bg>
+      <p:bgPr>
+        <a:blipFill dpi="0" rotWithShape="1">
+          <a:blip r:embed="rId3">
+            <a:lum/>
+          </a:blip>
+          <a:srcRect/>
+          <a:stretch>
+            <a:fillRect/>
+          </a:stretch>
+        </a:blipFill>
+        <a:effectLst/>
+      </p:bgPr>
+    </p:bg>
     <p:spTree>
       <p:nvGrpSpPr>
         <p:cNvPr id="1" name=""/>
@@ -10547,17 +11057,20 @@
           <a:lstStyle/>
           <a:p>
             <a:r>
-              <a:rPr lang="en-US" b="0" i="0" dirty="0">
-                <a:solidFill>
-                  <a:srgbClr val="000000"/>
-                </a:solidFill>
-                <a:effectLst/>
-                <a:latin typeface="+mn-lt"/>
+              <a:rPr lang="en-US" b="1" i="0" dirty="0">
+                <a:solidFill>
+                  <a:srgbClr val="0071F6"/>
+                </a:solidFill>
+                <a:effectLst/>
+                <a:latin typeface="Lexend" panose="020B0604020202020204"/>
               </a:rPr>
               <a:t>Working with directories</a:t>
             </a:r>
-            <a:endParaRPr lang="he-IL" dirty="0">
-              <a:latin typeface="+mn-lt"/>
+            <a:endParaRPr lang="he-IL" b="1" dirty="0">
+              <a:solidFill>
+                <a:srgbClr val="0071F6"/>
+              </a:solidFill>
+              <a:latin typeface="Lexend" panose="020B0604020202020204"/>
               <a:cs typeface="Calibri" panose="020F0502020204030204" pitchFamily="34" charset="0"/>
             </a:endParaRPr>
           </a:p>
@@ -10596,6 +11109,7 @@
                   <a:srgbClr val="000000"/>
                 </a:solidFill>
                 <a:effectLst/>
+                <a:latin typeface="Lexend Light"/>
               </a:rPr>
               <a:t>os.getcwd</a:t>
             </a:r>
@@ -10605,6 +11119,7 @@
                   <a:srgbClr val="000000"/>
                 </a:solidFill>
                 <a:effectLst/>
+                <a:latin typeface="Lexend Light"/>
               </a:rPr>
               <a:t>()</a:t>
             </a:r>
@@ -10614,6 +11129,7 @@
                   <a:srgbClr val="000000"/>
                 </a:solidFill>
                 <a:effectLst/>
+                <a:latin typeface="Lexend Light"/>
               </a:rPr>
               <a:t>— returns current working directory </a:t>
             </a:r>
@@ -10630,6 +11146,7 @@
                   <a:srgbClr val="000000"/>
                 </a:solidFill>
                 <a:effectLst/>
+                <a:latin typeface="Lexend Light"/>
               </a:rPr>
               <a:t>os.chdir</a:t>
             </a:r>
@@ -10639,6 +11156,7 @@
                   <a:srgbClr val="000000"/>
                 </a:solidFill>
                 <a:effectLst/>
+                <a:latin typeface="Lexend Light"/>
               </a:rPr>
               <a:t>(path)</a:t>
             </a:r>
@@ -10648,6 +11166,7 @@
                   <a:srgbClr val="000000"/>
                 </a:solidFill>
                 <a:effectLst/>
+                <a:latin typeface="Lexend Light"/>
               </a:rPr>
               <a:t>— change current directory </a:t>
             </a:r>
@@ -10662,6 +11181,7 @@
               <a:solidFill>
                 <a:srgbClr val="000000"/>
               </a:solidFill>
+              <a:latin typeface="Lexend Light"/>
             </a:endParaRPr>
           </a:p>
           <a:p>
@@ -10676,6 +11196,7 @@
                   <a:srgbClr val="000000"/>
                 </a:solidFill>
                 <a:effectLst/>
+                <a:latin typeface="Lexend Light"/>
               </a:rPr>
               <a:t>Create a directory named path </a:t>
             </a:r>
@@ -10685,6 +11206,7 @@
                   <a:srgbClr val="000000"/>
                 </a:solidFill>
                 <a:effectLst/>
+                <a:latin typeface="Lexend Light"/>
               </a:rPr>
               <a:t>os.mkdir</a:t>
             </a:r>
@@ -10694,6 +11216,7 @@
                   <a:srgbClr val="000000"/>
                 </a:solidFill>
                 <a:effectLst/>
+                <a:latin typeface="Lexend Light"/>
               </a:rPr>
               <a:t>(path) </a:t>
             </a:r>
@@ -10710,6 +11233,7 @@
                   <a:srgbClr val="000000"/>
                 </a:solidFill>
                 <a:effectLst/>
+                <a:latin typeface="Lexend Light"/>
               </a:rPr>
               <a:t>Recursive directory creation function. </a:t>
             </a:r>
@@ -10719,6 +11243,7 @@
                   <a:srgbClr val="000000"/>
                 </a:solidFill>
                 <a:effectLst/>
+                <a:latin typeface="Lexend Light"/>
               </a:rPr>
               <a:t>os.makedirs</a:t>
             </a:r>
@@ -10728,6 +11253,7 @@
                   <a:srgbClr val="000000"/>
                 </a:solidFill>
                 <a:effectLst/>
+                <a:latin typeface="Lexend Light"/>
               </a:rPr>
               <a:t>(path) </a:t>
             </a:r>
@@ -10743,6 +11269,7 @@
                 <a:srgbClr val="000000"/>
               </a:solidFill>
               <a:effectLst/>
+              <a:latin typeface="Lexend Light"/>
             </a:endParaRPr>
           </a:p>
           <a:p>
@@ -10757,6 +11284,7 @@
                   <a:srgbClr val="000000"/>
                 </a:solidFill>
                 <a:effectLst/>
+                <a:latin typeface="Lexend Light"/>
               </a:rPr>
               <a:t>Return a list of the entries in the directory given by path. </a:t>
             </a:r>
@@ -10766,6 +11294,7 @@
                   <a:srgbClr val="000000"/>
                 </a:solidFill>
                 <a:effectLst/>
+                <a:latin typeface="Lexend Light"/>
               </a:rPr>
               <a:t>os.listdir</a:t>
             </a:r>
@@ -10775,6 +11304,7 @@
                   <a:srgbClr val="000000"/>
                 </a:solidFill>
                 <a:effectLst/>
+                <a:latin typeface="Lexend Light"/>
               </a:rPr>
               <a:t>(path) </a:t>
             </a:r>
@@ -10790,6 +11320,7 @@
                 <a:srgbClr val="000000"/>
               </a:solidFill>
               <a:effectLst/>
+              <a:latin typeface="Lexend Light"/>
             </a:endParaRPr>
           </a:p>
           <a:p>
@@ -10804,6 +11335,7 @@
                   <a:srgbClr val="000000"/>
                 </a:solidFill>
                 <a:effectLst/>
+                <a:latin typeface="Lexend Light"/>
               </a:rPr>
               <a:t>Remove (delete) the file path. </a:t>
             </a:r>
@@ -10813,6 +11345,7 @@
                   <a:srgbClr val="000000"/>
                 </a:solidFill>
                 <a:effectLst/>
+                <a:latin typeface="Lexend Light"/>
               </a:rPr>
               <a:t>os.remove</a:t>
             </a:r>
@@ -10822,6 +11355,7 @@
                   <a:srgbClr val="000000"/>
                 </a:solidFill>
                 <a:effectLst/>
+                <a:latin typeface="Lexend Light"/>
               </a:rPr>
               <a:t>(path)</a:t>
             </a:r>
@@ -10831,6 +11365,7 @@
                   <a:srgbClr val="000000"/>
                 </a:solidFill>
                 <a:effectLst/>
+                <a:latin typeface="Lexend Light"/>
               </a:rPr>
               <a:t> </a:t>
             </a:r>
@@ -10847,6 +11382,7 @@
                   <a:srgbClr val="000000"/>
                 </a:solidFill>
                 <a:effectLst/>
+                <a:latin typeface="Lexend Light"/>
               </a:rPr>
               <a:t>Remove (delete) the directory path. </a:t>
             </a:r>
@@ -10856,6 +11392,7 @@
                   <a:srgbClr val="000000"/>
                 </a:solidFill>
                 <a:effectLst/>
+                <a:latin typeface="Lexend Light"/>
               </a:rPr>
               <a:t>os.rmdir</a:t>
             </a:r>
@@ -10865,10 +11402,12 @@
                   <a:srgbClr val="000000"/>
                 </a:solidFill>
                 <a:effectLst/>
+                <a:latin typeface="Lexend Light"/>
               </a:rPr>
               <a:t>(path)</a:t>
             </a:r>
             <a:endParaRPr lang="he-IL" sz="2400" b="1" dirty="0">
+              <a:latin typeface="Lexend Light"/>
               <a:cs typeface="Calibri" panose="020F0502020204030204" pitchFamily="34" charset="0"/>
             </a:endParaRPr>
           </a:p>
@@ -10890,6 +11429,20 @@
 <file path=ppt/slides/slide19.xml><?xml version="1.0" encoding="utf-8"?>
 <p:sld xmlns:a="http://schemas.openxmlformats.org/drawingml/2006/main" xmlns:r="http://schemas.openxmlformats.org/officeDocument/2006/relationships" xmlns:p="http://schemas.openxmlformats.org/presentationml/2006/main">
   <p:cSld>
+    <p:bg>
+      <p:bgPr>
+        <a:blipFill dpi="0" rotWithShape="1">
+          <a:blip r:embed="rId2">
+            <a:lum/>
+          </a:blip>
+          <a:srcRect/>
+          <a:stretch>
+            <a:fillRect/>
+          </a:stretch>
+        </a:blipFill>
+        <a:effectLst/>
+      </p:bgPr>
+    </p:bg>
     <p:spTree>
       <p:nvGrpSpPr>
         <p:cNvPr id="1" name=""/>
@@ -10920,10 +11473,14 @@
           <a:lstStyle/>
           <a:p>
             <a:r>
-              <a:rPr lang="en-US"/>
+              <a:rPr lang="en-US" b="1" dirty="0">
+                <a:latin typeface="Lexend Light"/>
+              </a:rPr>
               <a:t>Lab 02</a:t>
             </a:r>
-            <a:endParaRPr lang="he-IL" dirty="0"/>
+            <a:endParaRPr lang="he-IL" b="1" dirty="0">
+              <a:latin typeface="Lexend Light"/>
+            </a:endParaRPr>
           </a:p>
         </p:txBody>
       </p:sp>
@@ -10943,6 +11500,20 @@
 <file path=ppt/slides/slide2.xml><?xml version="1.0" encoding="utf-8"?>
 <p:sld xmlns:a="http://schemas.openxmlformats.org/drawingml/2006/main" xmlns:r="http://schemas.openxmlformats.org/officeDocument/2006/relationships" xmlns:p="http://schemas.openxmlformats.org/presentationml/2006/main">
   <p:cSld>
+    <p:bg>
+      <p:bgPr>
+        <a:blipFill dpi="0" rotWithShape="1">
+          <a:blip r:embed="rId2">
+            <a:lum/>
+          </a:blip>
+          <a:srcRect/>
+          <a:stretch>
+            <a:fillRect/>
+          </a:stretch>
+        </a:blipFill>
+        <a:effectLst/>
+      </p:bgPr>
+    </p:bg>
     <p:spTree>
       <p:nvGrpSpPr>
         <p:cNvPr id="1" name=""/>
@@ -10985,7 +11556,7 @@
                   <a:srgbClr val="000000"/>
                 </a:solidFill>
                 <a:effectLst/>
-                <a:latin typeface="+mn-lt"/>
+                <a:latin typeface="Lexend Light"/>
               </a:rPr>
               <a:t>Introduction</a:t>
             </a:r>
@@ -11002,7 +11573,7 @@
                   <a:srgbClr val="000000"/>
                 </a:solidFill>
                 <a:effectLst/>
-                <a:latin typeface="+mn-lt"/>
+                <a:latin typeface="Lexend Light"/>
               </a:rPr>
               <a:t>sys module </a:t>
             </a:r>
@@ -11019,7 +11590,7 @@
                   <a:srgbClr val="000000"/>
                 </a:solidFill>
                 <a:effectLst/>
-                <a:latin typeface="+mn-lt"/>
+                <a:latin typeface="Lexend Light"/>
               </a:rPr>
               <a:t>Command-line arguments </a:t>
             </a:r>
@@ -11036,7 +11607,7 @@
                   <a:srgbClr val="000000"/>
                 </a:solidFill>
                 <a:effectLst/>
-                <a:latin typeface="+mn-lt"/>
+                <a:latin typeface="Lexend Light"/>
               </a:rPr>
               <a:t>Standard data streams </a:t>
             </a:r>
@@ -11053,7 +11624,7 @@
                   <a:srgbClr val="000000"/>
                 </a:solidFill>
                 <a:effectLst/>
-                <a:latin typeface="+mn-lt"/>
+                <a:latin typeface="Lexend Light"/>
               </a:rPr>
               <a:t>Redirections </a:t>
             </a:r>
@@ -11070,7 +11641,7 @@
                   <a:srgbClr val="000000"/>
                 </a:solidFill>
                 <a:effectLst/>
-                <a:latin typeface="+mn-lt"/>
+                <a:latin typeface="Lexend Light"/>
               </a:rPr>
               <a:t>Exiting the program </a:t>
             </a:r>
@@ -11080,7 +11651,7 @@
                   <a:srgbClr val="000000"/>
                 </a:solidFill>
                 <a:effectLst/>
-                <a:latin typeface="+mn-lt"/>
+                <a:latin typeface="Lexend Light"/>
               </a:rPr>
               <a:t>os</a:t>
             </a:r>
@@ -11090,7 +11661,7 @@
                   <a:srgbClr val="000000"/>
                 </a:solidFill>
                 <a:effectLst/>
-                <a:latin typeface="+mn-lt"/>
+                <a:latin typeface="Lexend Light"/>
               </a:rPr>
               <a:t> module </a:t>
             </a:r>
@@ -11107,7 +11678,7 @@
                   <a:srgbClr val="000000"/>
                 </a:solidFill>
                 <a:effectLst/>
-                <a:latin typeface="+mn-lt"/>
+                <a:latin typeface="Lexend Light"/>
               </a:rPr>
               <a:t>Environment variables </a:t>
             </a:r>
@@ -11124,27 +11695,10 @@
                   <a:srgbClr val="000000"/>
                 </a:solidFill>
                 <a:effectLst/>
-                <a:latin typeface="+mn-lt"/>
-              </a:rPr>
-              <a:t>Working with </a:t>
-            </a:r>
-            <a:r>
-              <a:rPr lang="en-US" b="0" i="0">
-                <a:solidFill>
-                  <a:srgbClr val="000000"/>
-                </a:solidFill>
-                <a:effectLst/>
-                <a:latin typeface="+mn-lt"/>
-              </a:rPr>
-              <a:t>directories </a:t>
-            </a:r>
-            <a:endParaRPr lang="en-US" b="0" i="0" dirty="0">
-              <a:solidFill>
-                <a:srgbClr val="000000"/>
-              </a:solidFill>
-              <a:effectLst/>
-              <a:latin typeface="+mn-lt"/>
-            </a:endParaRPr>
+                <a:latin typeface="Lexend Light"/>
+              </a:rPr>
+              <a:t>Working with directories </a:t>
+            </a:r>
           </a:p>
         </p:txBody>
       </p:sp>
@@ -11164,10 +11718,20 @@
           <a:lstStyle/>
           <a:p>
             <a:r>
-              <a:rPr lang="en-US"/>
+              <a:rPr lang="en-US" b="1" dirty="0">
+                <a:solidFill>
+                  <a:srgbClr val="0071F6"/>
+                </a:solidFill>
+                <a:latin typeface="Lexend" panose="020B0604020202020204"/>
+              </a:rPr>
               <a:t>Agenda</a:t>
             </a:r>
-            <a:endParaRPr lang="he-IL"/>
+            <a:endParaRPr lang="he-IL" b="1" dirty="0">
+              <a:solidFill>
+                <a:srgbClr val="0071F6"/>
+              </a:solidFill>
+              <a:latin typeface="Lexend" panose="020B0604020202020204"/>
+            </a:endParaRPr>
           </a:p>
         </p:txBody>
       </p:sp>
@@ -11187,6 +11751,20 @@
 <file path=ppt/slides/slide20.xml><?xml version="1.0" encoding="utf-8"?>
 <p:sld xmlns:a="http://schemas.openxmlformats.org/drawingml/2006/main" xmlns:r="http://schemas.openxmlformats.org/officeDocument/2006/relationships" xmlns:p="http://schemas.openxmlformats.org/presentationml/2006/main">
   <p:cSld>
+    <p:bg>
+      <p:bgPr>
+        <a:blipFill dpi="0" rotWithShape="1">
+          <a:blip r:embed="rId2">
+            <a:lum/>
+          </a:blip>
+          <a:srcRect/>
+          <a:stretch>
+            <a:fillRect/>
+          </a:stretch>
+        </a:blipFill>
+        <a:effectLst/>
+      </p:bgPr>
+    </p:bg>
     <p:spTree>
       <p:nvGrpSpPr>
         <p:cNvPr id="1" name=""/>
@@ -11217,6 +11795,20 @@
 <file path=ppt/slides/slide3.xml><?xml version="1.0" encoding="utf-8"?>
 <p:sld xmlns:a="http://schemas.openxmlformats.org/drawingml/2006/main" xmlns:r="http://schemas.openxmlformats.org/officeDocument/2006/relationships" xmlns:p="http://schemas.openxmlformats.org/presentationml/2006/main">
   <p:cSld>
+    <p:bg>
+      <p:bgPr>
+        <a:blipFill dpi="0" rotWithShape="1">
+          <a:blip r:embed="rId3">
+            <a:lum/>
+          </a:blip>
+          <a:srcRect/>
+          <a:stretch>
+            <a:fillRect/>
+          </a:stretch>
+        </a:blipFill>
+        <a:effectLst/>
+      </p:bgPr>
+    </p:bg>
     <p:spTree>
       <p:nvGrpSpPr>
         <p:cNvPr id="1" name=""/>
@@ -11247,16 +11839,21 @@
           <a:lstStyle/>
           <a:p>
             <a:r>
-              <a:rPr lang="en-US" b="0" i="0" dirty="0">
-                <a:solidFill>
-                  <a:srgbClr val="000000"/>
-                </a:solidFill>
-                <a:effectLst/>
-                <a:latin typeface="+mn-lt"/>
+              <a:rPr lang="en-US" b="1" i="0" dirty="0">
+                <a:solidFill>
+                  <a:srgbClr val="0071F6"/>
+                </a:solidFill>
+                <a:effectLst/>
+                <a:latin typeface="Lexend" panose="020B0604020202020204"/>
               </a:rPr>
               <a:t>Introduction</a:t>
             </a:r>
-            <a:endParaRPr lang="he-IL" dirty="0"/>
+            <a:endParaRPr lang="he-IL" b="1" dirty="0">
+              <a:solidFill>
+                <a:srgbClr val="0071F6"/>
+              </a:solidFill>
+              <a:latin typeface="Lexend" panose="020B0604020202020204"/>
+            </a:endParaRPr>
           </a:p>
         </p:txBody>
       </p:sp>
@@ -11289,30 +11886,53 @@
                   <a:srgbClr val="000000"/>
                 </a:solidFill>
                 <a:effectLst/>
+                <a:latin typeface="Lexend Light"/>
               </a:rPr>
               <a:t>Working with the environment in Python refers to managing and manipulating the runtime environment in which a Python program executes.</a:t>
             </a:r>
           </a:p>
           <a:p>
             <a:pPr fontAlgn="base"/>
+            <a:endParaRPr lang="en-US" sz="2400" b="0" i="0" dirty="0">
+              <a:solidFill>
+                <a:srgbClr val="000000"/>
+              </a:solidFill>
+              <a:effectLst/>
+              <a:latin typeface="Lexend Light"/>
+            </a:endParaRPr>
+          </a:p>
+          <a:p>
+            <a:pPr fontAlgn="base"/>
             <a:r>
               <a:rPr lang="en-US" sz="2400" b="0" i="0" dirty="0">
                 <a:solidFill>
                   <a:srgbClr val="000000"/>
                 </a:solidFill>
                 <a:effectLst/>
+                <a:latin typeface="Lexend Light"/>
               </a:rPr>
               <a:t> The environment includes various system-level variables, configurations, and resources that affect the behavior of the program.</a:t>
             </a:r>
           </a:p>
           <a:p>
             <a:pPr fontAlgn="base"/>
+            <a:endParaRPr lang="en-US" sz="2400" b="0" i="0" dirty="0">
+              <a:solidFill>
+                <a:srgbClr val="000000"/>
+              </a:solidFill>
+              <a:effectLst/>
+              <a:latin typeface="Lexend Light"/>
+            </a:endParaRPr>
+          </a:p>
+          <a:p>
+            <a:pPr fontAlgn="base"/>
             <a:r>
               <a:rPr lang="en-US" sz="2400" b="0" i="0" dirty="0">
                 <a:solidFill>
                   <a:srgbClr val="000000"/>
                 </a:solidFill>
                 <a:effectLst/>
+                <a:latin typeface="Lexend Light"/>
               </a:rPr>
               <a:t>Python provides a module called </a:t>
             </a:r>
@@ -11322,6 +11942,7 @@
                   <a:srgbClr val="000000"/>
                 </a:solidFill>
                 <a:effectLst/>
+                <a:latin typeface="Lexend Light"/>
               </a:rPr>
               <a:t>os</a:t>
             </a:r>
@@ -11331,6 +11952,7 @@
                   <a:srgbClr val="000000"/>
                 </a:solidFill>
                 <a:effectLst/>
+                <a:latin typeface="Lexend Light"/>
               </a:rPr>
               <a:t> (Operating System) that allows developers to interact with the environment. It offers functions and methods to access and modify environment variables, work with files and directories, handle processes, and perform other system-related operations.</a:t>
             </a:r>
@@ -11339,6 +11961,7 @@
                 <a:srgbClr val="000000"/>
               </a:solidFill>
               <a:effectLst/>
+              <a:latin typeface="Lexend Light"/>
             </a:endParaRPr>
           </a:p>
         </p:txBody>
@@ -11359,6 +11982,20 @@
 <file path=ppt/slides/slide4.xml><?xml version="1.0" encoding="utf-8"?>
 <p:sld xmlns:a="http://schemas.openxmlformats.org/drawingml/2006/main" xmlns:r="http://schemas.openxmlformats.org/officeDocument/2006/relationships" xmlns:p="http://schemas.openxmlformats.org/presentationml/2006/main">
   <p:cSld>
+    <p:bg>
+      <p:bgPr>
+        <a:blipFill dpi="0" rotWithShape="1">
+          <a:blip r:embed="rId3">
+            <a:lum/>
+          </a:blip>
+          <a:srcRect/>
+          <a:stretch>
+            <a:fillRect/>
+          </a:stretch>
+        </a:blipFill>
+        <a:effectLst/>
+      </p:bgPr>
+    </p:bg>
     <p:spTree>
       <p:nvGrpSpPr>
         <p:cNvPr id="1" name=""/>
@@ -11383,25 +12020,32 @@
             <p:ph type="title"/>
           </p:nvPr>
         </p:nvSpPr>
-        <p:spPr/>
+        <p:spPr>
+          <a:xfrm>
+            <a:off x="838200" y="365125"/>
+            <a:ext cx="10515600" cy="771217"/>
+          </a:xfrm>
+        </p:spPr>
         <p:txBody>
           <a:bodyPr/>
           <a:lstStyle/>
           <a:p>
             <a:r>
-              <a:rPr lang="en-US" b="0" i="0" dirty="0">
-                <a:solidFill>
-                  <a:srgbClr val="000000"/>
-                </a:solidFill>
-                <a:effectLst/>
-                <a:latin typeface="+mn-lt"/>
+              <a:rPr lang="en-US" b="1" i="0" dirty="0">
+                <a:solidFill>
+                  <a:srgbClr val="0071F6"/>
+                </a:solidFill>
+                <a:effectLst/>
+                <a:latin typeface="Lexend" panose="020B0604020202020204"/>
               </a:rPr>
               <a:t>sys module </a:t>
             </a:r>
-            <a:br>
-              <a:rPr lang="en-US" dirty="0"/>
-            </a:br>
-            <a:endParaRPr lang="he-IL" dirty="0"/>
+            <a:endParaRPr lang="he-IL" b="1" dirty="0">
+              <a:solidFill>
+                <a:srgbClr val="0071F6"/>
+              </a:solidFill>
+              <a:latin typeface="Lexend" panose="020B0604020202020204"/>
+            </a:endParaRPr>
           </a:p>
         </p:txBody>
       </p:sp>
@@ -11434,6 +12078,7 @@
                   <a:srgbClr val="000000"/>
                 </a:solidFill>
                 <a:effectLst/>
+                <a:latin typeface="Lexend Light"/>
               </a:rPr>
               <a:t>This module provides a number of functions and variables that can be used to manipulate different parts of the Python runtime environment. </a:t>
             </a:r>
@@ -11446,6 +12091,7 @@
                   <a:srgbClr val="000000"/>
                 </a:solidFill>
                 <a:effectLst/>
+                <a:latin typeface="Lexend Light"/>
               </a:rPr>
               <a:t>This module provides: </a:t>
             </a:r>
@@ -11459,6 +12105,7 @@
                 <a:solidFill>
                   <a:srgbClr val="000000"/>
                 </a:solidFill>
+                <a:latin typeface="Lexend Light"/>
               </a:rPr>
               <a:t>	</a:t>
             </a:r>
@@ -11468,6 +12115,7 @@
                   <a:srgbClr val="000000"/>
                 </a:solidFill>
                 <a:effectLst/>
+                <a:latin typeface="Lexend Light"/>
               </a:rPr>
               <a:t>— access to some variables used or maintained by the interpreter, </a:t>
             </a:r>
@@ -11481,6 +12129,7 @@
                 <a:solidFill>
                   <a:srgbClr val="000000"/>
                 </a:solidFill>
+                <a:latin typeface="Lexend Light"/>
               </a:rPr>
               <a:t>	</a:t>
             </a:r>
@@ -11490,6 +12139,7 @@
                   <a:srgbClr val="000000"/>
                 </a:solidFill>
                 <a:effectLst/>
+                <a:latin typeface="Lexend Light"/>
               </a:rPr>
               <a:t>— access to functions that interact with the interpreter</a:t>
             </a:r>
@@ -11498,6 +12148,7 @@
                 <a:srgbClr val="000000"/>
               </a:solidFill>
               <a:effectLst/>
+              <a:latin typeface="Lexend Light"/>
             </a:endParaRPr>
           </a:p>
         </p:txBody>
@@ -11517,7 +12168,7 @@
           <p:nvPr/>
         </p:nvPicPr>
         <p:blipFill>
-          <a:blip r:embed="rId3"/>
+          <a:blip r:embed="rId4"/>
           <a:stretch>
             <a:fillRect/>
           </a:stretch>
@@ -11548,6 +12199,20 @@
 <file path=ppt/slides/slide5.xml><?xml version="1.0" encoding="utf-8"?>
 <p:sld xmlns:a="http://schemas.openxmlformats.org/drawingml/2006/main" xmlns:r="http://schemas.openxmlformats.org/officeDocument/2006/relationships" xmlns:p="http://schemas.openxmlformats.org/presentationml/2006/main">
   <p:cSld>
+    <p:bg>
+      <p:bgPr>
+        <a:blipFill dpi="0" rotWithShape="1">
+          <a:blip r:embed="rId3">
+            <a:lum/>
+          </a:blip>
+          <a:srcRect/>
+          <a:stretch>
+            <a:fillRect/>
+          </a:stretch>
+        </a:blipFill>
+        <a:effectLst/>
+      </p:bgPr>
+    </p:bg>
     <p:spTree>
       <p:nvGrpSpPr>
         <p:cNvPr id="1" name=""/>
@@ -11580,17 +12245,20 @@
           <a:lstStyle/>
           <a:p>
             <a:r>
-              <a:rPr lang="en-US" b="0" i="0" dirty="0">
-                <a:solidFill>
-                  <a:srgbClr val="000000"/>
-                </a:solidFill>
-                <a:effectLst/>
-                <a:latin typeface="+mn-lt"/>
+              <a:rPr lang="en-US" b="1" i="0" dirty="0">
+                <a:solidFill>
+                  <a:srgbClr val="0071F6"/>
+                </a:solidFill>
+                <a:effectLst/>
+                <a:latin typeface="Lexend" panose="020B0604020202020204"/>
               </a:rPr>
               <a:t>sys module — version and platform</a:t>
             </a:r>
-            <a:endParaRPr lang="he-IL" dirty="0">
-              <a:latin typeface="+mn-lt"/>
+            <a:endParaRPr lang="he-IL" b="1" dirty="0">
+              <a:solidFill>
+                <a:srgbClr val="0071F6"/>
+              </a:solidFill>
+              <a:latin typeface="Lexend" panose="020B0604020202020204"/>
             </a:endParaRPr>
           </a:p>
         </p:txBody>
@@ -11623,6 +12291,7 @@
                   <a:srgbClr val="000000"/>
                 </a:solidFill>
                 <a:effectLst/>
+                <a:latin typeface="Lexend Light"/>
               </a:rPr>
               <a:t>sys.version</a:t>
             </a:r>
@@ -11632,6 +12301,7 @@
                   <a:srgbClr val="000000"/>
                 </a:solidFill>
                 <a:effectLst/>
+                <a:latin typeface="Lexend Light"/>
               </a:rPr>
               <a:t> </a:t>
             </a:r>
@@ -11646,6 +12316,7 @@
                   <a:srgbClr val="000000"/>
                 </a:solidFill>
                 <a:effectLst/>
+                <a:latin typeface="Lexend Light"/>
               </a:rPr>
               <a:t>— The output: 3.4.3 (v3.4.3:9b73f1c3e601, Feb 24 2015, 22:43:06) [MSC v.1600 32 bit (Intel)] </a:t>
             </a:r>
@@ -11659,6 +12330,7 @@
                 <a:srgbClr val="000000"/>
               </a:solidFill>
               <a:effectLst/>
+              <a:latin typeface="Lexend Light"/>
             </a:endParaRPr>
           </a:p>
           <a:p>
@@ -11668,6 +12340,7 @@
                   <a:srgbClr val="000000"/>
                 </a:solidFill>
                 <a:effectLst/>
+                <a:latin typeface="Lexend Light"/>
               </a:rPr>
               <a:t>sys.platform</a:t>
             </a:r>
@@ -11677,119 +12350,130 @@
                   <a:srgbClr val="000000"/>
                 </a:solidFill>
                 <a:effectLst/>
+                <a:latin typeface="Lexend Light"/>
               </a:rPr>
               <a:t> </a:t>
             </a:r>
           </a:p>
           <a:p>
-            <a:pPr marL="0" indent="0">
+            <a:pPr marL="457200" lvl="1" indent="0">
               <a:buNone/>
             </a:pPr>
             <a:r>
-              <a:rPr lang="en-US" sz="2400" b="0" i="0" u="sng" dirty="0">
-                <a:solidFill>
-                  <a:srgbClr val="000000"/>
-                </a:solidFill>
-                <a:effectLst/>
+              <a:rPr lang="en-US" sz="2000" b="0" i="0" u="sng" dirty="0">
+                <a:solidFill>
+                  <a:srgbClr val="000000"/>
+                </a:solidFill>
+                <a:effectLst/>
+                <a:latin typeface="Lexend Light"/>
               </a:rPr>
               <a:t>System </a:t>
             </a:r>
             <a:r>
-              <a:rPr lang="en-US" sz="2400" b="0" i="0" dirty="0">
-                <a:solidFill>
-                  <a:srgbClr val="000000"/>
-                </a:solidFill>
-                <a:effectLst/>
+              <a:rPr lang="en-US" sz="2000" b="0" i="0" dirty="0">
+                <a:solidFill>
+                  <a:srgbClr val="000000"/>
+                </a:solidFill>
+                <a:effectLst/>
+                <a:latin typeface="Lexend Light"/>
               </a:rPr>
               <a:t>				</a:t>
             </a:r>
             <a:r>
-              <a:rPr lang="en-US" sz="2400" b="0" i="0" u="sng" dirty="0">
-                <a:solidFill>
-                  <a:srgbClr val="000000"/>
-                </a:solidFill>
-                <a:effectLst/>
+              <a:rPr lang="en-US" sz="2000" b="0" i="0" u="sng" dirty="0">
+                <a:solidFill>
+                  <a:srgbClr val="000000"/>
+                </a:solidFill>
+                <a:effectLst/>
+                <a:latin typeface="Lexend Light"/>
               </a:rPr>
               <a:t>platform value </a:t>
             </a:r>
           </a:p>
           <a:p>
-            <a:pPr marL="0" indent="0">
+            <a:pPr marL="457200" lvl="1" indent="0">
               <a:buNone/>
             </a:pPr>
             <a:r>
-              <a:rPr lang="en-US" sz="2400" b="0" i="0" dirty="0">
-                <a:solidFill>
-                  <a:srgbClr val="000000"/>
-                </a:solidFill>
-                <a:effectLst/>
+              <a:rPr lang="en-US" sz="2000" b="0" i="0" dirty="0">
+                <a:solidFill>
+                  <a:srgbClr val="000000"/>
+                </a:solidFill>
+                <a:effectLst/>
+                <a:latin typeface="Lexend Light"/>
               </a:rPr>
               <a:t>Linux (2.x and 3.x) 			linux2 </a:t>
             </a:r>
           </a:p>
           <a:p>
-            <a:pPr marL="0" indent="0">
+            <a:pPr marL="457200" lvl="1" indent="0">
               <a:buNone/>
             </a:pPr>
             <a:r>
-              <a:rPr lang="en-US" sz="2400" b="0" i="0" dirty="0">
-                <a:solidFill>
-                  <a:srgbClr val="000000"/>
-                </a:solidFill>
-                <a:effectLst/>
+              <a:rPr lang="en-US" sz="2000" b="0" i="0" dirty="0">
+                <a:solidFill>
+                  <a:srgbClr val="000000"/>
+                </a:solidFill>
+                <a:effectLst/>
+                <a:latin typeface="Lexend Light"/>
               </a:rPr>
               <a:t>Windows 				win32 </a:t>
             </a:r>
           </a:p>
           <a:p>
-            <a:pPr marL="0" indent="0">
+            <a:pPr marL="457200" lvl="1" indent="0">
               <a:buNone/>
             </a:pPr>
             <a:r>
-              <a:rPr lang="en-US" sz="2400" b="0" i="0" dirty="0">
-                <a:solidFill>
-                  <a:srgbClr val="000000"/>
-                </a:solidFill>
-                <a:effectLst/>
+              <a:rPr lang="en-US" sz="2000" b="0" i="0" dirty="0">
+                <a:solidFill>
+                  <a:srgbClr val="000000"/>
+                </a:solidFill>
+                <a:effectLst/>
+                <a:latin typeface="Lexend Light"/>
               </a:rPr>
               <a:t>Windows/Cygwin 			</a:t>
             </a:r>
             <a:r>
-              <a:rPr lang="en-US" sz="2400" b="0" i="0" dirty="0" err="1">
-                <a:solidFill>
-                  <a:srgbClr val="000000"/>
-                </a:solidFill>
-                <a:effectLst/>
+              <a:rPr lang="en-US" sz="2000" b="0" i="0" dirty="0" err="1">
+                <a:solidFill>
+                  <a:srgbClr val="000000"/>
+                </a:solidFill>
+                <a:effectLst/>
+                <a:latin typeface="Lexend Light"/>
               </a:rPr>
               <a:t>cygwin</a:t>
             </a:r>
             <a:r>
-              <a:rPr lang="en-US" sz="2400" b="0" i="0" dirty="0">
-                <a:solidFill>
-                  <a:srgbClr val="000000"/>
-                </a:solidFill>
-                <a:effectLst/>
+              <a:rPr lang="en-US" sz="2000" b="0" i="0" dirty="0">
+                <a:solidFill>
+                  <a:srgbClr val="000000"/>
+                </a:solidFill>
+                <a:effectLst/>
+                <a:latin typeface="Lexend Light"/>
               </a:rPr>
               <a:t> </a:t>
             </a:r>
           </a:p>
           <a:p>
-            <a:pPr marL="0" indent="0">
+            <a:pPr marL="457200" lvl="1" indent="0">
               <a:buNone/>
             </a:pPr>
             <a:r>
-              <a:rPr lang="en-US" sz="2400" b="0" i="0" dirty="0" err="1">
-                <a:solidFill>
-                  <a:srgbClr val="000000"/>
-                </a:solidFill>
-                <a:effectLst/>
+              <a:rPr lang="en-US" sz="2000" b="0" i="0" dirty="0" err="1">
+                <a:solidFill>
+                  <a:srgbClr val="000000"/>
+                </a:solidFill>
+                <a:effectLst/>
+                <a:latin typeface="Lexend Light"/>
               </a:rPr>
               <a:t>etc</a:t>
             </a:r>
-            <a:endParaRPr lang="en-US" sz="2400" dirty="0">
+            <a:endParaRPr lang="en-US" sz="2000" dirty="0">
               <a:solidFill>
                 <a:srgbClr val="000000"/>
               </a:solidFill>
+              <a:latin typeface="Lexend Light"/>
             </a:endParaRPr>
           </a:p>
         </p:txBody>
@@ -11810,6 +12494,20 @@
 <file path=ppt/slides/slide6.xml><?xml version="1.0" encoding="utf-8"?>
 <p:sld xmlns:a="http://schemas.openxmlformats.org/drawingml/2006/main" xmlns:r="http://schemas.openxmlformats.org/officeDocument/2006/relationships" xmlns:p="http://schemas.openxmlformats.org/presentationml/2006/main">
   <p:cSld>
+    <p:bg>
+      <p:bgPr>
+        <a:blipFill dpi="0" rotWithShape="1">
+          <a:blip r:embed="rId2">
+            <a:lum/>
+          </a:blip>
+          <a:srcRect/>
+          <a:stretch>
+            <a:fillRect/>
+          </a:stretch>
+        </a:blipFill>
+        <a:effectLst/>
+      </p:bgPr>
+    </p:bg>
     <p:spTree>
       <p:nvGrpSpPr>
         <p:cNvPr id="1" name=""/>
@@ -11847,17 +12545,20 @@
           <a:lstStyle/>
           <a:p>
             <a:r>
-              <a:rPr lang="en-US" b="0" i="0" dirty="0">
-                <a:solidFill>
-                  <a:srgbClr val="000000"/>
-                </a:solidFill>
-                <a:effectLst/>
-                <a:latin typeface="+mn-lt"/>
+              <a:rPr lang="en-US" b="1" i="0" dirty="0">
+                <a:solidFill>
+                  <a:srgbClr val="0071F6"/>
+                </a:solidFill>
+                <a:effectLst/>
+                <a:latin typeface="Lexend" panose="020B0604020202020204"/>
               </a:rPr>
               <a:t>Command-line arguments</a:t>
             </a:r>
-            <a:endParaRPr lang="he-IL" dirty="0">
-              <a:latin typeface="+mn-lt"/>
+            <a:endParaRPr lang="he-IL" b="1" dirty="0">
+              <a:solidFill>
+                <a:srgbClr val="0071F6"/>
+              </a:solidFill>
+              <a:latin typeface="Lexend" panose="020B0604020202020204"/>
             </a:endParaRPr>
           </a:p>
         </p:txBody>
@@ -11900,6 +12601,7 @@
                   <a:srgbClr val="000000"/>
                 </a:solidFill>
                 <a:effectLst/>
+                <a:latin typeface="Lexend Light"/>
               </a:rPr>
               <a:t>Arguments passed to a script called Command Line Arguments </a:t>
             </a:r>
@@ -11914,6 +12616,7 @@
                 <a:srgbClr val="000000"/>
               </a:solidFill>
               <a:effectLst/>
+              <a:latin typeface="Lexend Light"/>
             </a:endParaRPr>
           </a:p>
           <a:p>
@@ -11927,6 +12630,7 @@
                   <a:srgbClr val="000000"/>
                 </a:solidFill>
                 <a:effectLst/>
+                <a:latin typeface="Lexend Light"/>
               </a:rPr>
               <a:t>Python script can access those command line arguments through </a:t>
             </a:r>
@@ -11936,6 +12640,7 @@
                   <a:srgbClr val="000000"/>
                 </a:solidFill>
                 <a:effectLst/>
+                <a:latin typeface="Lexend Light"/>
               </a:rPr>
               <a:t>sys.argv</a:t>
             </a:r>
@@ -11945,6 +12650,7 @@
                   <a:srgbClr val="000000"/>
                 </a:solidFill>
                 <a:effectLst/>
+                <a:latin typeface="Lexend Light"/>
               </a:rPr>
               <a:t> list. </a:t>
             </a:r>
@@ -11959,6 +12665,7 @@
                 <a:srgbClr val="000000"/>
               </a:solidFill>
               <a:effectLst/>
+              <a:latin typeface="Lexend Light"/>
             </a:endParaRPr>
           </a:p>
           <a:p>
@@ -11972,6 +12679,7 @@
                   <a:srgbClr val="000000"/>
                 </a:solidFill>
                 <a:effectLst/>
+                <a:latin typeface="Lexend Light"/>
               </a:rPr>
               <a:t>The first item of this list is a path of the script itself </a:t>
             </a:r>
@@ -11981,22 +12689,33 @@
               <a:solidFill>
                 <a:srgbClr val="000000"/>
               </a:solidFill>
+              <a:latin typeface="Lexend Light"/>
             </a:endParaRPr>
           </a:p>
           <a:p>
-            <a:endParaRPr lang="en-US" dirty="0"/>
-          </a:p>
-          <a:p>
-            <a:endParaRPr lang="en-US" dirty="0"/>
-          </a:p>
-          <a:p>
-            <a:endParaRPr lang="en-US" dirty="0"/>
-          </a:p>
-          <a:p>
-            <a:endParaRPr lang="en-US" dirty="0"/>
-          </a:p>
-          <a:p>
-            <a:endParaRPr lang="he-IL" dirty="0"/>
+            <a:endParaRPr lang="en-US" dirty="0">
+              <a:latin typeface="Lexend Light"/>
+            </a:endParaRPr>
+          </a:p>
+          <a:p>
+            <a:endParaRPr lang="en-US" dirty="0">
+              <a:latin typeface="Lexend Light"/>
+            </a:endParaRPr>
+          </a:p>
+          <a:p>
+            <a:endParaRPr lang="en-US" dirty="0">
+              <a:latin typeface="Lexend Light"/>
+            </a:endParaRPr>
+          </a:p>
+          <a:p>
+            <a:endParaRPr lang="en-US" dirty="0">
+              <a:latin typeface="Lexend Light"/>
+            </a:endParaRPr>
+          </a:p>
+          <a:p>
+            <a:endParaRPr lang="he-IL" dirty="0">
+              <a:latin typeface="Lexend Light"/>
+            </a:endParaRPr>
           </a:p>
         </p:txBody>
       </p:sp>
@@ -12710,6 +13429,20 @@
 <file path=ppt/slides/slide7.xml><?xml version="1.0" encoding="utf-8"?>
 <p:sld xmlns:a="http://schemas.openxmlformats.org/drawingml/2006/main" xmlns:r="http://schemas.openxmlformats.org/officeDocument/2006/relationships" xmlns:p="http://schemas.openxmlformats.org/presentationml/2006/main">
   <p:cSld>
+    <p:bg>
+      <p:bgPr>
+        <a:blipFill dpi="0" rotWithShape="1">
+          <a:blip r:embed="rId2">
+            <a:lum/>
+          </a:blip>
+          <a:srcRect/>
+          <a:stretch>
+            <a:fillRect/>
+          </a:stretch>
+        </a:blipFill>
+        <a:effectLst/>
+      </p:bgPr>
+    </p:bg>
     <p:spTree>
       <p:nvGrpSpPr>
         <p:cNvPr id="1" name=""/>
@@ -12751,17 +13484,20 @@
           <a:lstStyle/>
           <a:p>
             <a:r>
-              <a:rPr lang="en-US" b="0" i="0" dirty="0">
-                <a:solidFill>
-                  <a:srgbClr val="000000"/>
-                </a:solidFill>
-                <a:effectLst/>
-                <a:latin typeface="+mn-lt"/>
+              <a:rPr lang="en-US" b="1" i="0" dirty="0">
+                <a:solidFill>
+                  <a:srgbClr val="0071F6"/>
+                </a:solidFill>
+                <a:effectLst/>
+                <a:latin typeface="Lexend" panose="020B0604020202020204"/>
               </a:rPr>
               <a:t>Standard data streams</a:t>
             </a:r>
-            <a:endParaRPr lang="he-IL" dirty="0">
-              <a:latin typeface="+mn-lt"/>
+            <a:endParaRPr lang="he-IL" b="1" dirty="0">
+              <a:solidFill>
+                <a:srgbClr val="0071F6"/>
+              </a:solidFill>
+              <a:latin typeface="Lexend" panose="020B0604020202020204"/>
               <a:cs typeface="Calibri" panose="020F0502020204030204" pitchFamily="34" charset="0"/>
             </a:endParaRPr>
           </a:p>
@@ -12801,6 +13537,7 @@
                   <a:srgbClr val="000000"/>
                 </a:solidFill>
                 <a:effectLst/>
+                <a:latin typeface="Lexend Light"/>
               </a:rPr>
               <a:t>Almost every programmer familiar with standard streams: </a:t>
             </a:r>
@@ -12815,6 +13552,7 @@
                   <a:srgbClr val="000000"/>
                 </a:solidFill>
                 <a:effectLst/>
+                <a:latin typeface="Lexend Light"/>
               </a:rPr>
               <a:t>— standard input - as default, connected to the keyboard </a:t>
             </a:r>
@@ -12829,6 +13567,7 @@
                   <a:srgbClr val="000000"/>
                 </a:solidFill>
                 <a:effectLst/>
+                <a:latin typeface="Lexend Light"/>
               </a:rPr>
               <a:t>— standard output - as default, connected to the terminal (or working window) </a:t>
             </a:r>
@@ -12843,6 +13582,7 @@
                   <a:srgbClr val="000000"/>
                 </a:solidFill>
                 <a:effectLst/>
+                <a:latin typeface="Lexend Light"/>
               </a:rPr>
               <a:t>— standard error - as default, connected to the terminal (or working window) </a:t>
             </a:r>
@@ -12856,6 +13596,7 @@
                 <a:srgbClr val="000000"/>
               </a:solidFill>
               <a:effectLst/>
+              <a:latin typeface="Lexend Light"/>
             </a:endParaRPr>
           </a:p>
           <a:p>
@@ -12865,6 +13606,7 @@
                   <a:srgbClr val="000000"/>
                 </a:solidFill>
                 <a:effectLst/>
+                <a:latin typeface="Lexend Light"/>
               </a:rPr>
               <a:t> These data streams can be accessed from Python </a:t>
             </a:r>
@@ -12874,6 +13616,7 @@
                   <a:srgbClr val="000000"/>
                 </a:solidFill>
                 <a:effectLst/>
+                <a:latin typeface="Lexend Light"/>
               </a:rPr>
               <a:t>via.the</a:t>
             </a:r>
@@ -12883,6 +13626,7 @@
                   <a:srgbClr val="000000"/>
                 </a:solidFill>
                 <a:effectLst/>
+                <a:latin typeface="Lexend Light"/>
               </a:rPr>
               <a:t> objects — of the sys module: </a:t>
             </a:r>
@@ -12892,6 +13636,7 @@
                   <a:srgbClr val="000000"/>
                 </a:solidFill>
                 <a:effectLst/>
+                <a:latin typeface="Lexend Light"/>
               </a:rPr>
               <a:t>sys.stdin</a:t>
             </a:r>
@@ -12901,6 +13646,7 @@
                   <a:srgbClr val="000000"/>
                 </a:solidFill>
                 <a:effectLst/>
+                <a:latin typeface="Lexend Light"/>
               </a:rPr>
               <a:t>, </a:t>
             </a:r>
@@ -12910,6 +13656,7 @@
                   <a:srgbClr val="000000"/>
                 </a:solidFill>
                 <a:effectLst/>
+                <a:latin typeface="Lexend Light"/>
               </a:rPr>
               <a:t>sys.stdout</a:t>
             </a:r>
@@ -12919,6 +13666,7 @@
                   <a:srgbClr val="000000"/>
                 </a:solidFill>
                 <a:effectLst/>
+                <a:latin typeface="Lexend Light"/>
               </a:rPr>
               <a:t> and </a:t>
             </a:r>
@@ -12928,6 +13676,7 @@
                   <a:srgbClr val="000000"/>
                 </a:solidFill>
                 <a:effectLst/>
+                <a:latin typeface="Lexend Light"/>
               </a:rPr>
               <a:t>sys.stderr</a:t>
             </a:r>
@@ -12937,10 +13686,12 @@
                   <a:srgbClr val="000000"/>
                 </a:solidFill>
                 <a:effectLst/>
+                <a:latin typeface="Lexend Light"/>
               </a:rPr>
               <a:t>.</a:t>
             </a:r>
             <a:endParaRPr lang="he-IL" dirty="0">
+              <a:latin typeface="Lexend Light"/>
               <a:cs typeface="Calibri" panose="020F0502020204030204" pitchFamily="34" charset="0"/>
             </a:endParaRPr>
           </a:p>
@@ -12962,6 +13713,20 @@
 <file path=ppt/slides/slide8.xml><?xml version="1.0" encoding="utf-8"?>
 <p:sld xmlns:a="http://schemas.openxmlformats.org/drawingml/2006/main" xmlns:r="http://schemas.openxmlformats.org/officeDocument/2006/relationships" xmlns:p="http://schemas.openxmlformats.org/presentationml/2006/main">
   <p:cSld>
+    <p:bg>
+      <p:bgPr>
+        <a:blipFill dpi="0" rotWithShape="1">
+          <a:blip r:embed="rId2">
+            <a:lum/>
+          </a:blip>
+          <a:srcRect/>
+          <a:stretch>
+            <a:fillRect/>
+          </a:stretch>
+        </a:blipFill>
+        <a:effectLst/>
+      </p:bgPr>
+    </p:bg>
     <p:spTree>
       <p:nvGrpSpPr>
         <p:cNvPr id="1" name=""/>
@@ -12992,16 +13757,18 @@
           <a:lstStyle/>
           <a:p>
             <a:r>
-              <a:rPr lang="en-US" b="0" i="0" dirty="0">
-                <a:solidFill>
-                  <a:srgbClr val="000000"/>
-                </a:solidFill>
-                <a:effectLst/>
-                <a:latin typeface="+mn-lt"/>
+              <a:rPr lang="en-US" b="1" i="0" dirty="0">
+                <a:solidFill>
+                  <a:srgbClr val="000000"/>
+                </a:solidFill>
+                <a:effectLst/>
+                <a:latin typeface="Lexend Light"/>
               </a:rPr>
               <a:t>Standard data streams</a:t>
             </a:r>
-            <a:endParaRPr lang="he-IL" dirty="0"/>
+            <a:endParaRPr lang="he-IL" b="1" dirty="0">
+              <a:latin typeface="Lexend Light"/>
+            </a:endParaRPr>
           </a:p>
         </p:txBody>
       </p:sp>
@@ -13021,6 +13788,20 @@
 <file path=ppt/slides/slide9.xml><?xml version="1.0" encoding="utf-8"?>
 <p:sld xmlns:a="http://schemas.openxmlformats.org/drawingml/2006/main" xmlns:r="http://schemas.openxmlformats.org/officeDocument/2006/relationships" xmlns:p="http://schemas.openxmlformats.org/presentationml/2006/main">
   <p:cSld>
+    <p:bg>
+      <p:bgPr>
+        <a:blipFill dpi="0" rotWithShape="1">
+          <a:blip r:embed="rId3">
+            <a:lum/>
+          </a:blip>
+          <a:srcRect/>
+          <a:stretch>
+            <a:fillRect/>
+          </a:stretch>
+        </a:blipFill>
+        <a:effectLst/>
+      </p:bgPr>
+    </p:bg>
     <p:spTree>
       <p:nvGrpSpPr>
         <p:cNvPr id="1" name=""/>
@@ -13053,17 +13834,20 @@
           <a:lstStyle/>
           <a:p>
             <a:r>
-              <a:rPr lang="en-US" b="0" i="0" dirty="0">
-                <a:solidFill>
-                  <a:srgbClr val="000000"/>
-                </a:solidFill>
-                <a:effectLst/>
-                <a:latin typeface="+mn-lt"/>
+              <a:rPr lang="en-US" b="1" i="0" dirty="0">
+                <a:solidFill>
+                  <a:srgbClr val="0071F6"/>
+                </a:solidFill>
+                <a:effectLst/>
+                <a:latin typeface="Lexend" panose="020B0604020202020204"/>
               </a:rPr>
               <a:t>Standard data streams — cont’d</a:t>
             </a:r>
-            <a:endParaRPr lang="en-US" dirty="0">
-              <a:latin typeface="+mn-lt"/>
+            <a:endParaRPr lang="en-US" b="1" dirty="0">
+              <a:solidFill>
+                <a:srgbClr val="0071F6"/>
+              </a:solidFill>
+              <a:latin typeface="Lexend" panose="020B0604020202020204"/>
             </a:endParaRPr>
           </a:p>
         </p:txBody>

</xml_diff>